<commit_message>
final version of presentation, minor edits to code. Add graphics by sample size for regular and adjusted Wald confidence intervals
</commit_message>
<xml_diff>
--- a/presentations/debuggingBernoulliTrials.pptx
+++ b/presentations/debuggingBernoulliTrials.pptx
@@ -5,7 +5,7 @@
     <p:sldMasterId id="2147483648" r:id="rId1"/>
   </p:sldMasterIdLst>
   <p:notesMasterIdLst>
-    <p:notesMasterId r:id="rId17"/>
+    <p:notesMasterId r:id="rId22"/>
   </p:notesMasterIdLst>
   <p:sldIdLst>
     <p:sldId id="256" r:id="rId2"/>
@@ -20,9 +20,14 @@
     <p:sldId id="287" r:id="rId11"/>
     <p:sldId id="288" r:id="rId12"/>
     <p:sldId id="289" r:id="rId13"/>
-    <p:sldId id="276" r:id="rId14"/>
-    <p:sldId id="290" r:id="rId15"/>
-    <p:sldId id="278" r:id="rId16"/>
+    <p:sldId id="291" r:id="rId14"/>
+    <p:sldId id="292" r:id="rId15"/>
+    <p:sldId id="295" r:id="rId16"/>
+    <p:sldId id="293" r:id="rId17"/>
+    <p:sldId id="294" r:id="rId18"/>
+    <p:sldId id="276" r:id="rId19"/>
+    <p:sldId id="290" r:id="rId20"/>
+    <p:sldId id="278" r:id="rId21"/>
   </p:sldIdLst>
   <p:sldSz cx="12192000" cy="6858000"/>
   <p:notesSz cx="6858000" cy="9144000"/>
@@ -211,7 +216,7 @@
           <a:p>
             <a:fld id="{18A5D979-93FC-144A-AB28-6BA00BC12244}" type="datetimeFigureOut">
               <a:rPr lang="en-US" smtClean="0"/>
-              <a:t>3/23/21</a:t>
+              <a:t>3/24/21</a:t>
             </a:fld>
             <a:endParaRPr lang="en-US"/>
           </a:p>
@@ -657,6 +662,174 @@
 </p:notes>
 </file>
 
+<file path=ppt/notesSlides/notesSlide3.xml><?xml version="1.0" encoding="utf-8"?>
+<p:notes xmlns:a="http://schemas.openxmlformats.org/drawingml/2006/main" xmlns:r="http://schemas.openxmlformats.org/officeDocument/2006/relationships" xmlns:p="http://schemas.openxmlformats.org/presentationml/2006/main">
+  <p:cSld>
+    <p:spTree>
+      <p:nvGrpSpPr>
+        <p:cNvPr id="1" name=""/>
+        <p:cNvGrpSpPr/>
+        <p:nvPr/>
+      </p:nvGrpSpPr>
+      <p:grpSpPr>
+        <a:xfrm>
+          <a:off x="0" y="0"/>
+          <a:ext cx="0" cy="0"/>
+          <a:chOff x="0" y="0"/>
+          <a:chExt cx="0" cy="0"/>
+        </a:xfrm>
+      </p:grpSpPr>
+      <p:sp>
+        <p:nvSpPr>
+          <p:cNvPr id="2" name="Slide Image Placeholder 1"/>
+          <p:cNvSpPr>
+            <a:spLocks noGrp="1" noRot="1" noChangeAspect="1"/>
+          </p:cNvSpPr>
+          <p:nvPr>
+            <p:ph type="sldImg"/>
+          </p:nvPr>
+        </p:nvSpPr>
+        <p:spPr/>
+      </p:sp>
+      <p:sp>
+        <p:nvSpPr>
+          <p:cNvPr id="3" name="Notes Placeholder 2"/>
+          <p:cNvSpPr>
+            <a:spLocks noGrp="1"/>
+          </p:cNvSpPr>
+          <p:nvPr>
+            <p:ph type="body" idx="1"/>
+          </p:nvPr>
+        </p:nvSpPr>
+        <p:spPr/>
+        <p:txBody>
+          <a:bodyPr/>
+          <a:lstStyle/>
+          <a:p>
+            <a:endParaRPr lang="en-US" dirty="0"/>
+          </a:p>
+        </p:txBody>
+      </p:sp>
+      <p:sp>
+        <p:nvSpPr>
+          <p:cNvPr id="4" name="Slide Number Placeholder 3"/>
+          <p:cNvSpPr>
+            <a:spLocks noGrp="1"/>
+          </p:cNvSpPr>
+          <p:nvPr>
+            <p:ph type="sldNum" sz="quarter" idx="5"/>
+          </p:nvPr>
+        </p:nvSpPr>
+        <p:spPr/>
+        <p:txBody>
+          <a:bodyPr/>
+          <a:lstStyle/>
+          <a:p>
+            <a:fld id="{ABA03B9F-5CD9-F644-B9E1-D29863D066F7}" type="slidenum">
+              <a:rPr lang="en-US" smtClean="0"/>
+              <a:t>17</a:t>
+            </a:fld>
+            <a:endParaRPr lang="en-US"/>
+          </a:p>
+        </p:txBody>
+      </p:sp>
+    </p:spTree>
+    <p:extLst>
+      <p:ext uri="{BB962C8B-B14F-4D97-AF65-F5344CB8AC3E}">
+        <p14:creationId xmlns:p14="http://schemas.microsoft.com/office/powerpoint/2010/main" val="1159391319"/>
+      </p:ext>
+    </p:extLst>
+  </p:cSld>
+  <p:clrMapOvr>
+    <a:masterClrMapping/>
+  </p:clrMapOvr>
+</p:notes>
+</file>
+
+<file path=ppt/notesSlides/notesSlide4.xml><?xml version="1.0" encoding="utf-8"?>
+<p:notes xmlns:a="http://schemas.openxmlformats.org/drawingml/2006/main" xmlns:r="http://schemas.openxmlformats.org/officeDocument/2006/relationships" xmlns:p="http://schemas.openxmlformats.org/presentationml/2006/main">
+  <p:cSld>
+    <p:spTree>
+      <p:nvGrpSpPr>
+        <p:cNvPr id="1" name=""/>
+        <p:cNvGrpSpPr/>
+        <p:nvPr/>
+      </p:nvGrpSpPr>
+      <p:grpSpPr>
+        <a:xfrm>
+          <a:off x="0" y="0"/>
+          <a:ext cx="0" cy="0"/>
+          <a:chOff x="0" y="0"/>
+          <a:chExt cx="0" cy="0"/>
+        </a:xfrm>
+      </p:grpSpPr>
+      <p:sp>
+        <p:nvSpPr>
+          <p:cNvPr id="2" name="Slide Image Placeholder 1"/>
+          <p:cNvSpPr>
+            <a:spLocks noGrp="1" noRot="1" noChangeAspect="1"/>
+          </p:cNvSpPr>
+          <p:nvPr>
+            <p:ph type="sldImg"/>
+          </p:nvPr>
+        </p:nvSpPr>
+        <p:spPr/>
+      </p:sp>
+      <p:sp>
+        <p:nvSpPr>
+          <p:cNvPr id="3" name="Notes Placeholder 2"/>
+          <p:cNvSpPr>
+            <a:spLocks noGrp="1"/>
+          </p:cNvSpPr>
+          <p:nvPr>
+            <p:ph type="body" idx="1"/>
+          </p:nvPr>
+        </p:nvSpPr>
+        <p:spPr/>
+        <p:txBody>
+          <a:bodyPr/>
+          <a:lstStyle/>
+          <a:p>
+            <a:endParaRPr lang="en-US" dirty="0"/>
+          </a:p>
+        </p:txBody>
+      </p:sp>
+      <p:sp>
+        <p:nvSpPr>
+          <p:cNvPr id="4" name="Slide Number Placeholder 3"/>
+          <p:cNvSpPr>
+            <a:spLocks noGrp="1"/>
+          </p:cNvSpPr>
+          <p:nvPr>
+            <p:ph type="sldNum" sz="quarter" idx="5"/>
+          </p:nvPr>
+        </p:nvSpPr>
+        <p:spPr/>
+        <p:txBody>
+          <a:bodyPr/>
+          <a:lstStyle/>
+          <a:p>
+            <a:fld id="{ABA03B9F-5CD9-F644-B9E1-D29863D066F7}" type="slidenum">
+              <a:rPr lang="en-US" smtClean="0"/>
+              <a:t>20</a:t>
+            </a:fld>
+            <a:endParaRPr lang="en-US"/>
+          </a:p>
+        </p:txBody>
+      </p:sp>
+    </p:spTree>
+    <p:extLst>
+      <p:ext uri="{BB962C8B-B14F-4D97-AF65-F5344CB8AC3E}">
+        <p14:creationId xmlns:p14="http://schemas.microsoft.com/office/powerpoint/2010/main" val="1556688201"/>
+      </p:ext>
+    </p:extLst>
+  </p:cSld>
+  <p:clrMapOvr>
+    <a:masterClrMapping/>
+  </p:clrMapOvr>
+</p:notes>
+</file>
+
 <file path=ppt/slideLayouts/slideLayout1.xml><?xml version="1.0" encoding="utf-8"?>
 <p:sldLayout xmlns:a="http://schemas.openxmlformats.org/drawingml/2006/main" xmlns:r="http://schemas.openxmlformats.org/officeDocument/2006/relationships" xmlns:p="http://schemas.openxmlformats.org/presentationml/2006/main" type="title" preserve="1">
   <p:cSld name="Title Slide">
@@ -804,7 +977,7 @@
           <a:p>
             <a:fld id="{211EC6DF-777A-4142-B847-255B1624343C}" type="datetimeFigureOut">
               <a:rPr lang="en-US" smtClean="0"/>
-              <a:t>3/23/21</a:t>
+              <a:t>3/24/21</a:t>
             </a:fld>
             <a:endParaRPr lang="en-US"/>
           </a:p>
@@ -1002,7 +1175,7 @@
           <a:p>
             <a:fld id="{211EC6DF-777A-4142-B847-255B1624343C}" type="datetimeFigureOut">
               <a:rPr lang="en-US" smtClean="0"/>
-              <a:t>3/23/21</a:t>
+              <a:t>3/24/21</a:t>
             </a:fld>
             <a:endParaRPr lang="en-US"/>
           </a:p>
@@ -1210,7 +1383,7 @@
           <a:p>
             <a:fld id="{211EC6DF-777A-4142-B847-255B1624343C}" type="datetimeFigureOut">
               <a:rPr lang="en-US" smtClean="0"/>
-              <a:t>3/23/21</a:t>
+              <a:t>3/24/21</a:t>
             </a:fld>
             <a:endParaRPr lang="en-US"/>
           </a:p>
@@ -1408,7 +1581,7 @@
           <a:p>
             <a:fld id="{211EC6DF-777A-4142-B847-255B1624343C}" type="datetimeFigureOut">
               <a:rPr lang="en-US" smtClean="0"/>
-              <a:t>3/23/21</a:t>
+              <a:t>3/24/21</a:t>
             </a:fld>
             <a:endParaRPr lang="en-US"/>
           </a:p>
@@ -1683,7 +1856,7 @@
           <a:p>
             <a:fld id="{211EC6DF-777A-4142-B847-255B1624343C}" type="datetimeFigureOut">
               <a:rPr lang="en-US" smtClean="0"/>
-              <a:t>3/23/21</a:t>
+              <a:t>3/24/21</a:t>
             </a:fld>
             <a:endParaRPr lang="en-US"/>
           </a:p>
@@ -1948,7 +2121,7 @@
           <a:p>
             <a:fld id="{211EC6DF-777A-4142-B847-255B1624343C}" type="datetimeFigureOut">
               <a:rPr lang="en-US" smtClean="0"/>
-              <a:t>3/23/21</a:t>
+              <a:t>3/24/21</a:t>
             </a:fld>
             <a:endParaRPr lang="en-US"/>
           </a:p>
@@ -2360,7 +2533,7 @@
           <a:p>
             <a:fld id="{211EC6DF-777A-4142-B847-255B1624343C}" type="datetimeFigureOut">
               <a:rPr lang="en-US" smtClean="0"/>
-              <a:t>3/23/21</a:t>
+              <a:t>3/24/21</a:t>
             </a:fld>
             <a:endParaRPr lang="en-US"/>
           </a:p>
@@ -2512,7 +2685,7 @@
           <a:p>
             <a:fld id="{211EC6DF-777A-4142-B847-255B1624343C}" type="datetimeFigureOut">
               <a:rPr lang="en-US" smtClean="0"/>
-              <a:t>3/23/21</a:t>
+              <a:t>3/24/21</a:t>
             </a:fld>
             <a:endParaRPr lang="en-US"/>
           </a:p>
@@ -2625,7 +2798,7 @@
           <a:p>
             <a:fld id="{211EC6DF-777A-4142-B847-255B1624343C}" type="datetimeFigureOut">
               <a:rPr lang="en-US" smtClean="0"/>
-              <a:t>3/23/21</a:t>
+              <a:t>3/24/21</a:t>
             </a:fld>
             <a:endParaRPr lang="en-US"/>
           </a:p>
@@ -2936,7 +3109,7 @@
           <a:p>
             <a:fld id="{211EC6DF-777A-4142-B847-255B1624343C}" type="datetimeFigureOut">
               <a:rPr lang="en-US" smtClean="0"/>
-              <a:t>3/23/21</a:t>
+              <a:t>3/24/21</a:t>
             </a:fld>
             <a:endParaRPr lang="en-US"/>
           </a:p>
@@ -3224,7 +3397,7 @@
           <a:p>
             <a:fld id="{211EC6DF-777A-4142-B847-255B1624343C}" type="datetimeFigureOut">
               <a:rPr lang="en-US" smtClean="0"/>
-              <a:t>3/23/21</a:t>
+              <a:t>3/24/21</a:t>
             </a:fld>
             <a:endParaRPr lang="en-US"/>
           </a:p>
@@ -3465,7 +3638,7 @@
           <a:p>
             <a:fld id="{211EC6DF-777A-4142-B847-255B1624343C}" type="datetimeFigureOut">
               <a:rPr lang="en-US" smtClean="0"/>
-              <a:t>3/23/21</a:t>
+              <a:t>3/24/21</a:t>
             </a:fld>
             <a:endParaRPr lang="en-US"/>
           </a:p>
@@ -4427,7 +4600,7 @@
         <p:spPr>
           <a:xfrm>
             <a:off x="8455989" y="2233626"/>
-            <a:ext cx="3390095" cy="1938992"/>
+            <a:ext cx="3529684" cy="2862322"/>
           </a:xfrm>
           <a:prstGeom prst="rect">
             <a:avLst/>
@@ -4477,6 +4650,33 @@
               <a:rPr lang="en-US" sz="2000" b="1" dirty="0"/>
               <a:t>n</a:t>
             </a:r>
+            <a:r>
+              <a:rPr lang="en-US" sz="2000" dirty="0"/>
+              <a:t> and cast result</a:t>
+            </a:r>
+            <a:br>
+              <a:rPr lang="en-US" sz="2000" dirty="0"/>
+            </a:br>
+            <a:r>
+              <a:rPr lang="en-US" sz="2000" dirty="0"/>
+              <a:t>as a </a:t>
+            </a:r>
+            <a:r>
+              <a:rPr lang="en-US" sz="2000" b="1" dirty="0"/>
+              <a:t>matrix()</a:t>
+            </a:r>
+            <a:r>
+              <a:rPr lang="en-US" sz="2000" dirty="0"/>
+              <a:t> of size </a:t>
+            </a:r>
+            <a:r>
+              <a:rPr lang="en-US" sz="2000" b="1" dirty="0"/>
+              <a:t>m * n</a:t>
+            </a:r>
+            <a:br>
+              <a:rPr lang="en-US" sz="2000" b="1" dirty="0"/>
+            </a:br>
+            <a:endParaRPr lang="en-US" sz="2000" b="1" dirty="0"/>
           </a:p>
           <a:p>
             <a:pPr marL="342900" indent="-342900">
@@ -4509,6 +4709,116 @@
             <a:r>
               <a:rPr lang="en-US" sz="2000" b="1" dirty="0"/>
               <a:t>  </a:t>
+            </a:r>
+            <a:r>
+              <a:rPr lang="en-US" sz="2000" dirty="0"/>
+              <a:t>and divide by </a:t>
+            </a:r>
+            <a:r>
+              <a:rPr lang="en-US" sz="2000" b="1" dirty="0"/>
+              <a:t>n</a:t>
+            </a:r>
+            <a:r>
+              <a:rPr lang="en-US" sz="2000" dirty="0"/>
+              <a:t>, which</a:t>
+            </a:r>
+            <a:br>
+              <a:rPr lang="en-US" sz="2000" dirty="0"/>
+            </a:br>
+            <a:r>
+              <a:rPr lang="en-US" sz="2000" dirty="0"/>
+              <a:t>represents trial size</a:t>
+            </a:r>
+            <a:r>
+              <a:rPr lang="en-US" sz="2000" b="1" dirty="0"/>
+              <a:t> </a:t>
+            </a:r>
+          </a:p>
+        </p:txBody>
+      </p:sp>
+      <p:sp>
+        <p:nvSpPr>
+          <p:cNvPr id="6" name="TextBox 5">
+            <a:extLst>
+              <a:ext uri="{FF2B5EF4-FFF2-40B4-BE49-F238E27FC236}">
+                <a16:creationId xmlns:a16="http://schemas.microsoft.com/office/drawing/2014/main" id="{3A3E137B-E0C0-9F49-932D-55B77F3834FA}"/>
+              </a:ext>
+            </a:extLst>
+          </p:cNvPr>
+          <p:cNvSpPr txBox="1"/>
+          <p:nvPr/>
+        </p:nvSpPr>
+        <p:spPr>
+          <a:xfrm>
+            <a:off x="685800" y="6023048"/>
+            <a:ext cx="8995027" cy="400110"/>
+          </a:xfrm>
+          <a:prstGeom prst="rect">
+            <a:avLst/>
+          </a:prstGeom>
+          <a:noFill/>
+        </p:spPr>
+        <p:txBody>
+          <a:bodyPr wrap="none" rtlCol="0">
+            <a:spAutoFit/>
+          </a:bodyPr>
+          <a:lstStyle/>
+          <a:p>
+            <a:r>
+              <a:rPr lang="en-US" sz="2000" dirty="0">
+                <a:solidFill>
+                  <a:srgbClr val="C00000"/>
+                </a:solidFill>
+              </a:rPr>
+              <a:t>Resulting solution makes 1 call to </a:t>
+            </a:r>
+            <a:r>
+              <a:rPr lang="en-US" sz="2000" b="1" dirty="0" err="1">
+                <a:solidFill>
+                  <a:srgbClr val="C00000"/>
+                </a:solidFill>
+              </a:rPr>
+              <a:t>rbinom</a:t>
+            </a:r>
+            <a:r>
+              <a:rPr lang="en-US" sz="2000" b="1" dirty="0">
+                <a:solidFill>
+                  <a:srgbClr val="C00000"/>
+                </a:solidFill>
+              </a:rPr>
+              <a:t>() </a:t>
+            </a:r>
+            <a:r>
+              <a:rPr lang="en-US" sz="2000" dirty="0">
+                <a:solidFill>
+                  <a:srgbClr val="C00000"/>
+                </a:solidFill>
+              </a:rPr>
+              <a:t>per iteration of </a:t>
+            </a:r>
+            <a:r>
+              <a:rPr lang="en-US" sz="2000" b="1" dirty="0" err="1">
+                <a:solidFill>
+                  <a:srgbClr val="C00000"/>
+                </a:solidFill>
+              </a:rPr>
+              <a:t>lapply</a:t>
+            </a:r>
+            <a:r>
+              <a:rPr lang="en-US" sz="2000" b="1" dirty="0">
+                <a:solidFill>
+                  <a:srgbClr val="C00000"/>
+                </a:solidFill>
+              </a:rPr>
+              <a:t>() </a:t>
+            </a:r>
+            <a:r>
+              <a:rPr lang="en-US" sz="2000" dirty="0">
+                <a:solidFill>
+                  <a:srgbClr val="C00000"/>
+                </a:solidFill>
+              </a:rPr>
+              <a:t>instead of 10,000</a:t>
             </a:r>
           </a:p>
         </p:txBody>
@@ -4741,6 +5051,94 @@
           </a:p>
         </p:txBody>
       </p:sp>
+      <p:cxnSp>
+        <p:nvCxnSpPr>
+          <p:cNvPr id="7" name="Straight Arrow Connector 6">
+            <a:extLst>
+              <a:ext uri="{FF2B5EF4-FFF2-40B4-BE49-F238E27FC236}">
+                <a16:creationId xmlns:a16="http://schemas.microsoft.com/office/drawing/2014/main" id="{18933F7A-97C3-0E4C-BD6F-C4321268ED2D}"/>
+              </a:ext>
+            </a:extLst>
+          </p:cNvPr>
+          <p:cNvCxnSpPr>
+            <a:cxnSpLocks/>
+          </p:cNvCxnSpPr>
+          <p:nvPr/>
+        </p:nvCxnSpPr>
+        <p:spPr>
+          <a:xfrm flipH="1" flipV="1">
+            <a:off x="1965960" y="2621280"/>
+            <a:ext cx="4892040" cy="941222"/>
+          </a:xfrm>
+          <a:prstGeom prst="straightConnector1">
+            <a:avLst/>
+          </a:prstGeom>
+          <a:ln>
+            <a:solidFill>
+              <a:srgbClr val="C00000"/>
+            </a:solidFill>
+            <a:tailEnd type="triangle"/>
+          </a:ln>
+        </p:spPr>
+        <p:style>
+          <a:lnRef idx="1">
+            <a:schemeClr val="accent1"/>
+          </a:lnRef>
+          <a:fillRef idx="0">
+            <a:schemeClr val="accent1"/>
+          </a:fillRef>
+          <a:effectRef idx="0">
+            <a:schemeClr val="accent1"/>
+          </a:effectRef>
+          <a:fontRef idx="minor">
+            <a:schemeClr val="tx1"/>
+          </a:fontRef>
+        </p:style>
+      </p:cxnSp>
+      <p:cxnSp>
+        <p:nvCxnSpPr>
+          <p:cNvPr id="10" name="Straight Arrow Connector 9">
+            <a:extLst>
+              <a:ext uri="{FF2B5EF4-FFF2-40B4-BE49-F238E27FC236}">
+                <a16:creationId xmlns:a16="http://schemas.microsoft.com/office/drawing/2014/main" id="{3479D3F8-B9BA-1C41-B1D4-7EE5B34DE233}"/>
+              </a:ext>
+            </a:extLst>
+          </p:cNvPr>
+          <p:cNvCxnSpPr>
+            <a:cxnSpLocks/>
+          </p:cNvCxnSpPr>
+          <p:nvPr/>
+        </p:nvCxnSpPr>
+        <p:spPr>
+          <a:xfrm flipH="1">
+            <a:off x="2377440" y="4537151"/>
+            <a:ext cx="4480560" cy="964489"/>
+          </a:xfrm>
+          <a:prstGeom prst="straightConnector1">
+            <a:avLst/>
+          </a:prstGeom>
+          <a:ln>
+            <a:solidFill>
+              <a:srgbClr val="C00000"/>
+            </a:solidFill>
+            <a:tailEnd type="triangle"/>
+          </a:ln>
+        </p:spPr>
+        <p:style>
+          <a:lnRef idx="1">
+            <a:schemeClr val="accent1"/>
+          </a:lnRef>
+          <a:fillRef idx="0">
+            <a:schemeClr val="accent1"/>
+          </a:fillRef>
+          <a:effectRef idx="0">
+            <a:schemeClr val="accent1"/>
+          </a:effectRef>
+          <a:fontRef idx="minor">
+            <a:schemeClr val="tx1"/>
+          </a:fontRef>
+        </p:style>
+      </p:cxnSp>
     </p:spTree>
     <p:extLst>
       <p:ext uri="{BB962C8B-B14F-4D97-AF65-F5344CB8AC3E}">
@@ -4773,10 +5171,98 @@
       </p:grpSpPr>
       <p:sp>
         <p:nvSpPr>
-          <p:cNvPr id="3" name="TextBox 2">
-            <a:extLst>
-              <a:ext uri="{FF2B5EF4-FFF2-40B4-BE49-F238E27FC236}">
-                <a16:creationId xmlns:a16="http://schemas.microsoft.com/office/drawing/2014/main" id="{D639DFBB-76B2-E64D-91BA-C82ACDE98D30}"/>
+          <p:cNvPr id="2" name="Title 1">
+            <a:extLst>
+              <a:ext uri="{FF2B5EF4-FFF2-40B4-BE49-F238E27FC236}">
+                <a16:creationId xmlns:a16="http://schemas.microsoft.com/office/drawing/2014/main" id="{0530D142-84DD-3D46-ACF8-A3D2C3A43892}"/>
+              </a:ext>
+            </a:extLst>
+          </p:cNvPr>
+          <p:cNvSpPr>
+            <a:spLocks noGrp="1"/>
+          </p:cNvSpPr>
+          <p:nvPr>
+            <p:ph type="title"/>
+          </p:nvPr>
+        </p:nvSpPr>
+        <p:spPr/>
+        <p:txBody>
+          <a:bodyPr/>
+          <a:lstStyle/>
+          <a:p>
+            <a:r>
+              <a:rPr lang="en-US" dirty="0"/>
+              <a:t>A more sophisticated solution</a:t>
+            </a:r>
+          </a:p>
+        </p:txBody>
+      </p:sp>
+      <p:pic>
+        <p:nvPicPr>
+          <p:cNvPr id="3" name="Picture 2">
+            <a:extLst>
+              <a:ext uri="{FF2B5EF4-FFF2-40B4-BE49-F238E27FC236}">
+                <a16:creationId xmlns:a16="http://schemas.microsoft.com/office/drawing/2014/main" id="{0FD5D85E-754E-9848-9043-F6959E692E26}"/>
+              </a:ext>
+            </a:extLst>
+          </p:cNvPr>
+          <p:cNvPicPr>
+            <a:picLocks noChangeAspect="1"/>
+          </p:cNvPicPr>
+          <p:nvPr/>
+        </p:nvPicPr>
+        <p:blipFill>
+          <a:blip r:embed="rId2"/>
+          <a:stretch>
+            <a:fillRect/>
+          </a:stretch>
+        </p:blipFill>
+        <p:spPr>
+          <a:xfrm>
+            <a:off x="838200" y="1450340"/>
+            <a:ext cx="9448800" cy="3073400"/>
+          </a:xfrm>
+          <a:prstGeom prst="rect">
+            <a:avLst/>
+          </a:prstGeom>
+        </p:spPr>
+      </p:pic>
+      <p:pic>
+        <p:nvPicPr>
+          <p:cNvPr id="4" name="Picture 3">
+            <a:extLst>
+              <a:ext uri="{FF2B5EF4-FFF2-40B4-BE49-F238E27FC236}">
+                <a16:creationId xmlns:a16="http://schemas.microsoft.com/office/drawing/2014/main" id="{3B94F44B-B6E4-6D4D-B13A-AF8972C4DA47}"/>
+              </a:ext>
+            </a:extLst>
+          </p:cNvPr>
+          <p:cNvPicPr>
+            <a:picLocks noChangeAspect="1"/>
+          </p:cNvPicPr>
+          <p:nvPr/>
+        </p:nvPicPr>
+        <p:blipFill>
+          <a:blip r:embed="rId3"/>
+          <a:stretch>
+            <a:fillRect/>
+          </a:stretch>
+        </p:blipFill>
+        <p:spPr>
+          <a:xfrm>
+            <a:off x="838200" y="4781550"/>
+            <a:ext cx="5638800" cy="952500"/>
+          </a:xfrm>
+          <a:prstGeom prst="rect">
+            <a:avLst/>
+          </a:prstGeom>
+        </p:spPr>
+      </p:pic>
+      <p:sp>
+        <p:nvSpPr>
+          <p:cNvPr id="5" name="TextBox 4">
+            <a:extLst>
+              <a:ext uri="{FF2B5EF4-FFF2-40B4-BE49-F238E27FC236}">
+                <a16:creationId xmlns:a16="http://schemas.microsoft.com/office/drawing/2014/main" id="{BF3FBC67-1CA2-EE46-8BB3-092E42AA60A0}"/>
               </a:ext>
             </a:extLst>
           </p:cNvPr>
@@ -4785,8 +5271,8 @@
         </p:nvSpPr>
         <p:spPr>
           <a:xfrm>
-            <a:off x="4526165" y="2967200"/>
-            <a:ext cx="3401893" cy="1569660"/>
+            <a:off x="10287000" y="1073651"/>
+            <a:ext cx="1852495" cy="1169551"/>
           </a:xfrm>
           <a:prstGeom prst="rect">
             <a:avLst/>
@@ -4800,8 +5286,120 @@
           <a:lstStyle/>
           <a:p>
             <a:r>
-              <a:rPr lang="en-US" sz="9600" dirty="0"/>
-              <a:t>Q &amp; A </a:t>
+              <a:rPr lang="en-US" sz="1400" dirty="0"/>
+              <a:t>Use Boolean argument</a:t>
+            </a:r>
+            <a:br>
+              <a:rPr lang="en-US" sz="1400" dirty="0"/>
+            </a:br>
+            <a:r>
+              <a:rPr lang="en-US" sz="1400" dirty="0"/>
+              <a:t>to calculate </a:t>
+            </a:r>
+            <a:br>
+              <a:rPr lang="en-US" sz="1400" dirty="0"/>
+            </a:br>
+            <a:r>
+              <a:rPr lang="en-US" sz="1400" dirty="0"/>
+              <a:t>Adjusted Wald</a:t>
+            </a:r>
+          </a:p>
+          <a:p>
+            <a:r>
+              <a:rPr lang="en-US" sz="1400" dirty="0"/>
+              <a:t>confidence </a:t>
+            </a:r>
+            <a:br>
+              <a:rPr lang="en-US" sz="1400" dirty="0"/>
+            </a:br>
+            <a:r>
+              <a:rPr lang="en-US" sz="1400" dirty="0"/>
+              <a:t>intervals </a:t>
+            </a:r>
+          </a:p>
+        </p:txBody>
+      </p:sp>
+      <p:cxnSp>
+        <p:nvCxnSpPr>
+          <p:cNvPr id="7" name="Straight Arrow Connector 6">
+            <a:extLst>
+              <a:ext uri="{FF2B5EF4-FFF2-40B4-BE49-F238E27FC236}">
+                <a16:creationId xmlns:a16="http://schemas.microsoft.com/office/drawing/2014/main" id="{F5D870D8-63D9-4D43-8548-5F03173BAE02}"/>
+              </a:ext>
+            </a:extLst>
+          </p:cNvPr>
+          <p:cNvCxnSpPr/>
+          <p:nvPr/>
+        </p:nvCxnSpPr>
+        <p:spPr>
+          <a:xfrm flipH="1">
+            <a:off x="8427720" y="1600200"/>
+            <a:ext cx="1615440" cy="701040"/>
+          </a:xfrm>
+          <a:prstGeom prst="straightConnector1">
+            <a:avLst/>
+          </a:prstGeom>
+          <a:ln>
+            <a:solidFill>
+              <a:srgbClr val="C00000"/>
+            </a:solidFill>
+            <a:tailEnd type="triangle"/>
+          </a:ln>
+        </p:spPr>
+        <p:style>
+          <a:lnRef idx="1">
+            <a:schemeClr val="accent1"/>
+          </a:lnRef>
+          <a:fillRef idx="0">
+            <a:schemeClr val="accent1"/>
+          </a:fillRef>
+          <a:effectRef idx="0">
+            <a:schemeClr val="accent1"/>
+          </a:effectRef>
+          <a:fontRef idx="minor">
+            <a:schemeClr val="tx1"/>
+          </a:fontRef>
+        </p:style>
+      </p:cxnSp>
+      <p:sp>
+        <p:nvSpPr>
+          <p:cNvPr id="8" name="TextBox 7">
+            <a:extLst>
+              <a:ext uri="{FF2B5EF4-FFF2-40B4-BE49-F238E27FC236}">
+                <a16:creationId xmlns:a16="http://schemas.microsoft.com/office/drawing/2014/main" id="{8A1867ED-9D39-D043-ACD8-CDC1307E89EA}"/>
+              </a:ext>
+            </a:extLst>
+          </p:cNvPr>
+          <p:cNvSpPr txBox="1"/>
+          <p:nvPr/>
+        </p:nvSpPr>
+        <p:spPr>
+          <a:xfrm>
+            <a:off x="838200" y="6213193"/>
+            <a:ext cx="3337260" cy="369332"/>
+          </a:xfrm>
+          <a:prstGeom prst="rect">
+            <a:avLst/>
+          </a:prstGeom>
+          <a:noFill/>
+        </p:spPr>
+        <p:txBody>
+          <a:bodyPr wrap="none" rtlCol="0">
+            <a:spAutoFit/>
+          </a:bodyPr>
+          <a:lstStyle/>
+          <a:p>
+            <a:r>
+              <a:rPr lang="en-US" dirty="0"/>
+              <a:t>Reference: </a:t>
+            </a:r>
+            <a:r>
+              <a:rPr lang="en-US" dirty="0" err="1"/>
+              <a:t>Sauro</a:t>
+            </a:r>
+            <a:r>
+              <a:rPr lang="en-US" dirty="0"/>
+              <a:t> and Lewis, 2005</a:t>
             </a:r>
           </a:p>
         </p:txBody>
@@ -4809,7 +5407,7 @@
     </p:spTree>
     <p:extLst>
       <p:ext uri="{BB962C8B-B14F-4D97-AF65-F5344CB8AC3E}">
-        <p14:creationId xmlns:p14="http://schemas.microsoft.com/office/powerpoint/2010/main" val="3085140371"/>
+        <p14:creationId xmlns:p14="http://schemas.microsoft.com/office/powerpoint/2010/main" val="3738204836"/>
       </p:ext>
     </p:extLst>
   </p:cSld>
@@ -4841,7 +5439,7 @@
           <p:cNvPr id="2" name="Title 1">
             <a:extLst>
               <a:ext uri="{FF2B5EF4-FFF2-40B4-BE49-F238E27FC236}">
-                <a16:creationId xmlns:a16="http://schemas.microsoft.com/office/drawing/2014/main" id="{B6E12943-F375-9A4E-9A27-CADD138F80A5}"/>
+                <a16:creationId xmlns:a16="http://schemas.microsoft.com/office/drawing/2014/main" id="{3D9B8D10-3646-064E-B219-91168F927F19}"/>
               </a:ext>
             </a:extLst>
           </p:cNvPr>
@@ -4859,17 +5457,47 @@
           <a:p>
             <a:r>
               <a:rPr lang="en-US" dirty="0"/>
-              <a:t>References</a:t>
-            </a:r>
-          </a:p>
-        </p:txBody>
-      </p:sp>
-      <p:sp>
-        <p:nvSpPr>
-          <p:cNvPr id="3" name="TextBox 2">
-            <a:extLst>
-              <a:ext uri="{FF2B5EF4-FFF2-40B4-BE49-F238E27FC236}">
-                <a16:creationId xmlns:a16="http://schemas.microsoft.com/office/drawing/2014/main" id="{4C39AB42-EC56-B94E-A94E-9644D979DF28}"/>
+              <a:t>Run 132 Monte Carlo Simulations</a:t>
+            </a:r>
+          </a:p>
+        </p:txBody>
+      </p:sp>
+      <p:pic>
+        <p:nvPicPr>
+          <p:cNvPr id="4" name="Picture 3">
+            <a:extLst>
+              <a:ext uri="{FF2B5EF4-FFF2-40B4-BE49-F238E27FC236}">
+                <a16:creationId xmlns:a16="http://schemas.microsoft.com/office/drawing/2014/main" id="{54F416E1-F5B3-4C40-B35B-1A9B3C9497BE}"/>
+              </a:ext>
+            </a:extLst>
+          </p:cNvPr>
+          <p:cNvPicPr>
+            <a:picLocks noChangeAspect="1"/>
+          </p:cNvPicPr>
+          <p:nvPr/>
+        </p:nvPicPr>
+        <p:blipFill>
+          <a:blip r:embed="rId2"/>
+          <a:stretch>
+            <a:fillRect/>
+          </a:stretch>
+        </p:blipFill>
+        <p:spPr>
+          <a:xfrm>
+            <a:off x="976630" y="1527810"/>
+            <a:ext cx="9080500" cy="3314700"/>
+          </a:xfrm>
+          <a:prstGeom prst="rect">
+            <a:avLst/>
+          </a:prstGeom>
+        </p:spPr>
+      </p:pic>
+      <p:sp>
+        <p:nvSpPr>
+          <p:cNvPr id="5" name="TextBox 4">
+            <a:extLst>
+              <a:ext uri="{FF2B5EF4-FFF2-40B4-BE49-F238E27FC236}">
+                <a16:creationId xmlns:a16="http://schemas.microsoft.com/office/drawing/2014/main" id="{49FC2C79-DF32-D949-AB30-4BFE0C007F16}"/>
               </a:ext>
             </a:extLst>
           </p:cNvPr>
@@ -4878,8 +5506,8 @@
         </p:nvSpPr>
         <p:spPr>
           <a:xfrm>
-            <a:off x="1127760" y="1828800"/>
-            <a:ext cx="9769406" cy="2246769"/>
+            <a:off x="10057130" y="1527810"/>
+            <a:ext cx="1633396" cy="369332"/>
           </a:xfrm>
           <a:prstGeom prst="rect">
             <a:avLst/>
@@ -4893,92 +5521,209 @@
           <a:lstStyle/>
           <a:p>
             <a:r>
-              <a:rPr lang="en-US" sz="2000" dirty="0"/>
-              <a:t>Monte Carlo Simulation of Bernoulli Trials (blog article version of this presentation</a:t>
-            </a:r>
-            <a:r>
-              <a:rPr lang="en-US" sz="2000"/>
-              <a:t>): </a:t>
-            </a:r>
-            <a:br>
-              <a:rPr lang="en-US" sz="2000"/>
-            </a:br>
-            <a:r>
-              <a:rPr lang="en-US" sz="2000">
-                <a:hlinkClick r:id="rId2"/>
+              <a:rPr lang="en-US" dirty="0">
+                <a:solidFill>
+                  <a:schemeClr val="accent2">
+                    <a:lumMod val="75000"/>
+                  </a:schemeClr>
+                </a:solidFill>
               </a:rPr>
-              <a:t>http</a:t>
-            </a:r>
-            <a:r>
-              <a:rPr lang="en-US" sz="2000" dirty="0">
-                <a:hlinkClick r:id="rId2"/>
+              <a:t>12 sample sizes</a:t>
+            </a:r>
+          </a:p>
+        </p:txBody>
+      </p:sp>
+      <p:sp>
+        <p:nvSpPr>
+          <p:cNvPr id="6" name="TextBox 5">
+            <a:extLst>
+              <a:ext uri="{FF2B5EF4-FFF2-40B4-BE49-F238E27FC236}">
+                <a16:creationId xmlns:a16="http://schemas.microsoft.com/office/drawing/2014/main" id="{4DE3ABDC-F8CD-1F4C-999A-D70CB87DF703}"/>
+              </a:ext>
+            </a:extLst>
+          </p:cNvPr>
+          <p:cNvSpPr txBox="1"/>
+          <p:nvPr/>
+        </p:nvSpPr>
+        <p:spPr>
+          <a:xfrm>
+            <a:off x="10452879" y="4473178"/>
+            <a:ext cx="1237647" cy="369332"/>
+          </a:xfrm>
+          <a:prstGeom prst="rect">
+            <a:avLst/>
+          </a:prstGeom>
+          <a:noFill/>
+        </p:spPr>
+        <p:txBody>
+          <a:bodyPr wrap="none" rtlCol="0">
+            <a:spAutoFit/>
+          </a:bodyPr>
+          <a:lstStyle/>
+          <a:p>
+            <a:r>
+              <a:rPr lang="en-US" dirty="0">
+                <a:solidFill>
+                  <a:schemeClr val="accent2">
+                    <a:lumMod val="75000"/>
+                  </a:schemeClr>
+                </a:solidFill>
               </a:rPr>
-              <a:t>://bit.ly/2PicLJN</a:t>
-            </a:r>
-            <a:r>
-              <a:rPr lang="en-US" sz="2000" dirty="0"/>
-              <a:t> </a:t>
-            </a:r>
-          </a:p>
-          <a:p>
-            <a:endParaRPr lang="en-US" sz="2000" dirty="0"/>
-          </a:p>
-          <a:p>
-            <a:r>
-              <a:rPr lang="en-US" sz="2000" dirty="0"/>
-              <a:t>Coverage probability for confidence interval (</a:t>
-            </a:r>
-            <a:r>
-              <a:rPr lang="en-US" sz="2000" dirty="0" err="1"/>
-              <a:t>Stackoverflow</a:t>
-            </a:r>
-            <a:r>
-              <a:rPr lang="en-US" sz="2000" dirty="0"/>
-              <a:t> question): </a:t>
-            </a:r>
-            <a:r>
-              <a:rPr lang="en-US" sz="2000" dirty="0">
-                <a:hlinkClick r:id="rId3"/>
+              <a:t>11 p values</a:t>
+            </a:r>
+          </a:p>
+        </p:txBody>
+      </p:sp>
+      <p:cxnSp>
+        <p:nvCxnSpPr>
+          <p:cNvPr id="8" name="Straight Arrow Connector 7">
+            <a:extLst>
+              <a:ext uri="{FF2B5EF4-FFF2-40B4-BE49-F238E27FC236}">
+                <a16:creationId xmlns:a16="http://schemas.microsoft.com/office/drawing/2014/main" id="{D74FBD0E-F58D-A14D-99A8-6DE8FB0AE64E}"/>
+              </a:ext>
+            </a:extLst>
+          </p:cNvPr>
+          <p:cNvCxnSpPr>
+            <a:cxnSpLocks/>
+            <a:stCxn id="5" idx="1"/>
+          </p:cNvCxnSpPr>
+          <p:nvPr/>
+        </p:nvCxnSpPr>
+        <p:spPr>
+          <a:xfrm flipH="1">
+            <a:off x="9372600" y="1712476"/>
+            <a:ext cx="684530" cy="329684"/>
+          </a:xfrm>
+          <a:prstGeom prst="straightConnector1">
+            <a:avLst/>
+          </a:prstGeom>
+          <a:ln>
+            <a:tailEnd type="triangle"/>
+          </a:ln>
+        </p:spPr>
+        <p:style>
+          <a:lnRef idx="1">
+            <a:schemeClr val="accent1"/>
+          </a:lnRef>
+          <a:fillRef idx="0">
+            <a:schemeClr val="accent1"/>
+          </a:fillRef>
+          <a:effectRef idx="0">
+            <a:schemeClr val="accent1"/>
+          </a:effectRef>
+          <a:fontRef idx="minor">
+            <a:schemeClr val="tx1"/>
+          </a:fontRef>
+        </p:style>
+      </p:cxnSp>
+      <p:cxnSp>
+        <p:nvCxnSpPr>
+          <p:cNvPr id="11" name="Straight Arrow Connector 10">
+            <a:extLst>
+              <a:ext uri="{FF2B5EF4-FFF2-40B4-BE49-F238E27FC236}">
+                <a16:creationId xmlns:a16="http://schemas.microsoft.com/office/drawing/2014/main" id="{82C56921-5E9E-214E-A1CF-389A469C0C5D}"/>
+              </a:ext>
+            </a:extLst>
+          </p:cNvPr>
+          <p:cNvCxnSpPr>
+            <a:stCxn id="6" idx="1"/>
+          </p:cNvCxnSpPr>
+          <p:nvPr/>
+        </p:nvCxnSpPr>
+        <p:spPr>
+          <a:xfrm flipH="1">
+            <a:off x="9714865" y="4657844"/>
+            <a:ext cx="738014" cy="0"/>
+          </a:xfrm>
+          <a:prstGeom prst="straightConnector1">
+            <a:avLst/>
+          </a:prstGeom>
+          <a:ln>
+            <a:tailEnd type="triangle"/>
+          </a:ln>
+        </p:spPr>
+        <p:style>
+          <a:lnRef idx="1">
+            <a:schemeClr val="accent1"/>
+          </a:lnRef>
+          <a:fillRef idx="0">
+            <a:schemeClr val="accent1"/>
+          </a:fillRef>
+          <a:effectRef idx="0">
+            <a:schemeClr val="accent1"/>
+          </a:effectRef>
+          <a:fontRef idx="minor">
+            <a:schemeClr val="tx1"/>
+          </a:fontRef>
+        </p:style>
+      </p:cxnSp>
+      <p:pic>
+        <p:nvPicPr>
+          <p:cNvPr id="12" name="Picture 11">
+            <a:extLst>
+              <a:ext uri="{FF2B5EF4-FFF2-40B4-BE49-F238E27FC236}">
+                <a16:creationId xmlns:a16="http://schemas.microsoft.com/office/drawing/2014/main" id="{368DF7D3-B30B-B24F-93FA-D9CA9E9A3DAC}"/>
+              </a:ext>
+            </a:extLst>
+          </p:cNvPr>
+          <p:cNvPicPr>
+            <a:picLocks noChangeAspect="1"/>
+          </p:cNvPicPr>
+          <p:nvPr/>
+        </p:nvPicPr>
+        <p:blipFill>
+          <a:blip r:embed="rId3"/>
+          <a:stretch>
+            <a:fillRect/>
+          </a:stretch>
+        </p:blipFill>
+        <p:spPr>
+          <a:xfrm>
+            <a:off x="976630" y="5330190"/>
+            <a:ext cx="2247900" cy="647700"/>
+          </a:xfrm>
+          <a:prstGeom prst="rect">
+            <a:avLst/>
+          </a:prstGeom>
+        </p:spPr>
+      </p:pic>
+      <p:sp>
+        <p:nvSpPr>
+          <p:cNvPr id="13" name="TextBox 12">
+            <a:extLst>
+              <a:ext uri="{FF2B5EF4-FFF2-40B4-BE49-F238E27FC236}">
+                <a16:creationId xmlns:a16="http://schemas.microsoft.com/office/drawing/2014/main" id="{548C8AF6-8A03-4644-BC45-BE3A0CF5D645}"/>
+              </a:ext>
+            </a:extLst>
+          </p:cNvPr>
+          <p:cNvSpPr txBox="1"/>
+          <p:nvPr/>
+        </p:nvSpPr>
+        <p:spPr>
+          <a:xfrm>
+            <a:off x="3427239" y="5469374"/>
+            <a:ext cx="4674998" cy="369332"/>
+          </a:xfrm>
+          <a:prstGeom prst="rect">
+            <a:avLst/>
+          </a:prstGeom>
+          <a:noFill/>
+        </p:spPr>
+        <p:txBody>
+          <a:bodyPr wrap="none" rtlCol="0">
+            <a:spAutoFit/>
+          </a:bodyPr>
+          <a:lstStyle/>
+          <a:p>
+            <a:r>
+              <a:rPr lang="en-US" dirty="0">
+                <a:solidFill>
+                  <a:schemeClr val="accent2">
+                    <a:lumMod val="75000"/>
+                  </a:schemeClr>
+                </a:solidFill>
               </a:rPr>
-              <a:t>https://bit.ly/33l04lC</a:t>
-            </a:r>
-            <a:r>
-              <a:rPr lang="en-US" sz="2000" dirty="0"/>
-              <a:t> </a:t>
-            </a:r>
-          </a:p>
-          <a:p>
-            <a:endParaRPr lang="en-US" sz="2000" dirty="0"/>
-          </a:p>
-          <a:p>
-            <a:r>
-              <a:rPr lang="en-US" sz="2000" dirty="0"/>
-              <a:t>Estimating Completion Rates from Small Sample Sizes Using Binomial</a:t>
-            </a:r>
-            <a:br>
-              <a:rPr lang="en-US" sz="2000" dirty="0"/>
-            </a:br>
-            <a:r>
-              <a:rPr lang="en-US" sz="2000" dirty="0"/>
-              <a:t>Confidence Intervals, </a:t>
-            </a:r>
-            <a:r>
-              <a:rPr lang="en-US" sz="2000" dirty="0" err="1"/>
-              <a:t>Sauro</a:t>
-            </a:r>
-            <a:r>
-              <a:rPr lang="en-US" sz="2000" dirty="0"/>
-              <a:t> &amp; Lewis 2005: </a:t>
-            </a:r>
-            <a:r>
-              <a:rPr lang="en-US" sz="2000" dirty="0">
-                <a:hlinkClick r:id="rId4"/>
-              </a:rPr>
-              <a:t>http://bit.ly/estimatingCoverageRates</a:t>
-            </a:r>
-            <a:r>
-              <a:rPr lang="en-US" sz="2000" dirty="0"/>
-              <a:t> </a:t>
+              <a:t>Yes, the 132 simulations ran in under 7 seconds </a:t>
             </a:r>
           </a:p>
         </p:txBody>
@@ -4986,7 +5731,7 @@
     </p:spTree>
     <p:extLst>
       <p:ext uri="{BB962C8B-B14F-4D97-AF65-F5344CB8AC3E}">
-        <p14:creationId xmlns:p14="http://schemas.microsoft.com/office/powerpoint/2010/main" val="2291217490"/>
+        <p14:creationId xmlns:p14="http://schemas.microsoft.com/office/powerpoint/2010/main" val="3416188089"/>
       </p:ext>
     </p:extLst>
   </p:cSld>
@@ -5018,7 +5763,7 @@
           <p:cNvPr id="2" name="Title 1">
             <a:extLst>
               <a:ext uri="{FF2B5EF4-FFF2-40B4-BE49-F238E27FC236}">
-                <a16:creationId xmlns:a16="http://schemas.microsoft.com/office/drawing/2014/main" id="{6092EAB6-FFEF-B54D-886F-29B8FBD73691}"/>
+                <a16:creationId xmlns:a16="http://schemas.microsoft.com/office/drawing/2014/main" id="{A5CAAD30-742E-2D4D-BF34-B730CDB8A51D}"/>
               </a:ext>
             </a:extLst>
           </p:cNvPr>
@@ -5036,17 +5781,25 @@
           <a:p>
             <a:r>
               <a:rPr lang="en-US" dirty="0"/>
-              <a:t>About Len</a:t>
+              <a:t>Results for </a:t>
+            </a:r>
+            <a:r>
+              <a:rPr lang="en-US" dirty="0" err="1"/>
+              <a:t>sample_size</a:t>
+            </a:r>
+            <a:r>
+              <a:rPr lang="en-US" dirty="0"/>
+              <a:t> = 5</a:t>
             </a:r>
           </a:p>
         </p:txBody>
       </p:sp>
       <p:pic>
         <p:nvPicPr>
-          <p:cNvPr id="4" name="Picture 3">
-            <a:extLst>
-              <a:ext uri="{FF2B5EF4-FFF2-40B4-BE49-F238E27FC236}">
-                <a16:creationId xmlns:a16="http://schemas.microsoft.com/office/drawing/2014/main" id="{F5842CDC-9BCF-ED4A-B142-F82CFFC48374}"/>
+          <p:cNvPr id="3" name="Picture 2">
+            <a:extLst>
+              <a:ext uri="{FF2B5EF4-FFF2-40B4-BE49-F238E27FC236}">
+                <a16:creationId xmlns:a16="http://schemas.microsoft.com/office/drawing/2014/main" id="{CF05D457-25FB-AB46-B087-F46BB18FEFA0}"/>
               </a:ext>
             </a:extLst>
           </p:cNvPr>
@@ -5063,62 +5816,50 @@
         </p:blipFill>
         <p:spPr>
           <a:xfrm>
-            <a:off x="838200" y="1487692"/>
-            <a:ext cx="1828800" cy="1848679"/>
+            <a:off x="994410" y="1731010"/>
+            <a:ext cx="5600700" cy="3060700"/>
           </a:xfrm>
           <a:prstGeom prst="rect">
             <a:avLst/>
           </a:prstGeom>
         </p:spPr>
       </p:pic>
-      <p:sp>
-        <p:nvSpPr>
-          <p:cNvPr id="5" name="TextBox 4">
-            <a:extLst>
-              <a:ext uri="{FF2B5EF4-FFF2-40B4-BE49-F238E27FC236}">
-                <a16:creationId xmlns:a16="http://schemas.microsoft.com/office/drawing/2014/main" id="{6414056E-90F6-7344-ACA0-21B67F079388}"/>
-              </a:ext>
-            </a:extLst>
-          </p:cNvPr>
-          <p:cNvSpPr txBox="1"/>
-          <p:nvPr/>
-        </p:nvSpPr>
-        <p:spPr>
-          <a:xfrm>
-            <a:off x="1456297" y="3810270"/>
-            <a:ext cx="2116605" cy="369332"/>
-          </a:xfrm>
-          <a:prstGeom prst="rect">
-            <a:avLst/>
-          </a:prstGeom>
-          <a:noFill/>
-        </p:spPr>
-        <p:txBody>
-          <a:bodyPr wrap="none" rtlCol="0">
-            <a:spAutoFit/>
-          </a:bodyPr>
-          <a:lstStyle/>
-          <a:p>
-            <a:r>
-              <a:rPr lang="en-US" dirty="0"/>
-              <a:t> </a:t>
-            </a:r>
-            <a:r>
-              <a:rPr lang="en-US" dirty="0">
-                <a:hlinkClick r:id="rId3"/>
-              </a:rPr>
-              <a:t>len@greskilabs.com</a:t>
-            </a:r>
-            <a:endParaRPr lang="en-US" dirty="0"/>
-          </a:p>
-        </p:txBody>
-      </p:sp>
+    </p:spTree>
+    <p:extLst>
+      <p:ext uri="{BB962C8B-B14F-4D97-AF65-F5344CB8AC3E}">
+        <p14:creationId xmlns:p14="http://schemas.microsoft.com/office/powerpoint/2010/main" val="4171677224"/>
+      </p:ext>
+    </p:extLst>
+  </p:cSld>
+  <p:clrMapOvr>
+    <a:masterClrMapping/>
+  </p:clrMapOvr>
+</p:sld>
+</file>
+
+<file path=ppt/slides/slide16.xml><?xml version="1.0" encoding="utf-8"?>
+<p:sld xmlns:a="http://schemas.openxmlformats.org/drawingml/2006/main" xmlns:r="http://schemas.openxmlformats.org/officeDocument/2006/relationships" xmlns:p="http://schemas.openxmlformats.org/presentationml/2006/main">
+  <p:cSld>
+    <p:spTree>
+      <p:nvGrpSpPr>
+        <p:cNvPr id="1" name=""/>
+        <p:cNvGrpSpPr/>
+        <p:nvPr/>
+      </p:nvGrpSpPr>
+      <p:grpSpPr>
+        <a:xfrm>
+          <a:off x="0" y="0"/>
+          <a:ext cx="0" cy="0"/>
+          <a:chOff x="0" y="0"/>
+          <a:chExt cx="0" cy="0"/>
+        </a:xfrm>
+      </p:grpSpPr>
       <p:pic>
         <p:nvPicPr>
-          <p:cNvPr id="6" name="Picture 5">
-            <a:extLst>
-              <a:ext uri="{FF2B5EF4-FFF2-40B4-BE49-F238E27FC236}">
-                <a16:creationId xmlns:a16="http://schemas.microsoft.com/office/drawing/2014/main" id="{C78A498D-59ED-254A-8EA3-0F3D3158DAB6}"/>
+          <p:cNvPr id="4" name="Picture 3">
+            <a:extLst>
+              <a:ext uri="{FF2B5EF4-FFF2-40B4-BE49-F238E27FC236}">
+                <a16:creationId xmlns:a16="http://schemas.microsoft.com/office/drawing/2014/main" id="{F34F4627-C03F-4943-A562-F614E59FF60F}"/>
               </a:ext>
             </a:extLst>
           </p:cNvPr>
@@ -5128,27 +5869,57 @@
           <p:nvPr/>
         </p:nvPicPr>
         <p:blipFill>
-          <a:blip r:embed="rId4"/>
+          <a:blip r:embed="rId2"/>
           <a:stretch>
             <a:fillRect/>
           </a:stretch>
         </p:blipFill>
         <p:spPr>
           <a:xfrm>
-            <a:off x="912737" y="4410881"/>
-            <a:ext cx="355600" cy="368300"/>
+            <a:off x="502920" y="138413"/>
+            <a:ext cx="8877329" cy="6581174"/>
           </a:xfrm>
           <a:prstGeom prst="rect">
             <a:avLst/>
           </a:prstGeom>
         </p:spPr>
       </p:pic>
+    </p:spTree>
+    <p:extLst>
+      <p:ext uri="{BB962C8B-B14F-4D97-AF65-F5344CB8AC3E}">
+        <p14:creationId xmlns:p14="http://schemas.microsoft.com/office/powerpoint/2010/main" val="2158295507"/>
+      </p:ext>
+    </p:extLst>
+  </p:cSld>
+  <p:clrMapOvr>
+    <a:masterClrMapping/>
+  </p:clrMapOvr>
+</p:sld>
+</file>
+
+<file path=ppt/slides/slide17.xml><?xml version="1.0" encoding="utf-8"?>
+<p:sld xmlns:a="http://schemas.openxmlformats.org/drawingml/2006/main" xmlns:r="http://schemas.openxmlformats.org/officeDocument/2006/relationships" xmlns:p="http://schemas.openxmlformats.org/presentationml/2006/main">
+  <p:cSld>
+    <p:spTree>
+      <p:nvGrpSpPr>
+        <p:cNvPr id="1" name=""/>
+        <p:cNvGrpSpPr/>
+        <p:nvPr/>
+      </p:nvGrpSpPr>
+      <p:grpSpPr>
+        <a:xfrm>
+          <a:off x="0" y="0"/>
+          <a:ext cx="0" cy="0"/>
+          <a:chOff x="0" y="0"/>
+          <a:chExt cx="0" cy="0"/>
+        </a:xfrm>
+      </p:grpSpPr>
       <p:pic>
         <p:nvPicPr>
-          <p:cNvPr id="7" name="Picture 6">
-            <a:extLst>
-              <a:ext uri="{FF2B5EF4-FFF2-40B4-BE49-F238E27FC236}">
-                <a16:creationId xmlns:a16="http://schemas.microsoft.com/office/drawing/2014/main" id="{8564C8CC-7A1B-5848-BB26-0560A3F83B9A}"/>
+          <p:cNvPr id="4" name="Picture 3">
+            <a:extLst>
+              <a:ext uri="{FF2B5EF4-FFF2-40B4-BE49-F238E27FC236}">
+                <a16:creationId xmlns:a16="http://schemas.microsoft.com/office/drawing/2014/main" id="{6FD20175-6319-0D45-9881-872E163E91D1}"/>
               </a:ext>
             </a:extLst>
           </p:cNvPr>
@@ -5158,27 +5929,69 @@
           <p:nvPr/>
         </p:nvPicPr>
         <p:blipFill>
-          <a:blip r:embed="rId5"/>
+          <a:blip r:embed="rId3"/>
           <a:stretch>
             <a:fillRect/>
           </a:stretch>
         </p:blipFill>
         <p:spPr>
           <a:xfrm>
-            <a:off x="882257" y="3810270"/>
-            <a:ext cx="419100" cy="419100"/>
+            <a:off x="350520" y="185806"/>
+            <a:ext cx="8915400" cy="6624339"/>
           </a:xfrm>
           <a:prstGeom prst="rect">
             <a:avLst/>
           </a:prstGeom>
         </p:spPr>
       </p:pic>
-      <p:sp>
-        <p:nvSpPr>
-          <p:cNvPr id="8" name="TextBox 7">
-            <a:extLst>
-              <a:ext uri="{FF2B5EF4-FFF2-40B4-BE49-F238E27FC236}">
-                <a16:creationId xmlns:a16="http://schemas.microsoft.com/office/drawing/2014/main" id="{C121EDAC-2901-CC45-A0A7-8D75B4C1AB41}"/>
+      <p:cxnSp>
+        <p:nvCxnSpPr>
+          <p:cNvPr id="6" name="Straight Arrow Connector 5">
+            <a:extLst>
+              <a:ext uri="{FF2B5EF4-FFF2-40B4-BE49-F238E27FC236}">
+                <a16:creationId xmlns:a16="http://schemas.microsoft.com/office/drawing/2014/main" id="{12EBEE50-A42B-8747-AB58-CF3766D8D1AC}"/>
+              </a:ext>
+            </a:extLst>
+          </p:cNvPr>
+          <p:cNvCxnSpPr/>
+          <p:nvPr/>
+        </p:nvCxnSpPr>
+        <p:spPr>
+          <a:xfrm flipH="1" flipV="1">
+            <a:off x="2346960" y="899160"/>
+            <a:ext cx="350520" cy="579120"/>
+          </a:xfrm>
+          <a:prstGeom prst="straightConnector1">
+            <a:avLst/>
+          </a:prstGeom>
+          <a:ln>
+            <a:solidFill>
+              <a:srgbClr val="C00000"/>
+            </a:solidFill>
+            <a:tailEnd type="triangle"/>
+          </a:ln>
+        </p:spPr>
+        <p:style>
+          <a:lnRef idx="1">
+            <a:schemeClr val="accent1"/>
+          </a:lnRef>
+          <a:fillRef idx="0">
+            <a:schemeClr val="accent1"/>
+          </a:fillRef>
+          <a:effectRef idx="0">
+            <a:schemeClr val="accent1"/>
+          </a:effectRef>
+          <a:fontRef idx="minor">
+            <a:schemeClr val="tx1"/>
+          </a:fontRef>
+        </p:style>
+      </p:cxnSp>
+      <p:sp>
+        <p:nvSpPr>
+          <p:cNvPr id="7" name="TextBox 6">
+            <a:extLst>
+              <a:ext uri="{FF2B5EF4-FFF2-40B4-BE49-F238E27FC236}">
+                <a16:creationId xmlns:a16="http://schemas.microsoft.com/office/drawing/2014/main" id="{D5D9D77F-0EED-0749-A519-60B940C9BE55}"/>
               </a:ext>
             </a:extLst>
           </p:cNvPr>
@@ -5187,8 +6000,8 @@
         </p:nvSpPr>
         <p:spPr>
           <a:xfrm>
-            <a:off x="1456297" y="4296832"/>
-            <a:ext cx="838884" cy="369332"/>
+            <a:off x="2204162" y="1478280"/>
+            <a:ext cx="2280368" cy="954107"/>
           </a:xfrm>
           <a:prstGeom prst="rect">
             <a:avLst/>
@@ -5202,23 +6015,69 @@
           <a:lstStyle/>
           <a:p>
             <a:r>
-              <a:rPr lang="en-US" dirty="0"/>
-              <a:t> </a:t>
-            </a:r>
-            <a:r>
-              <a:rPr lang="en-US" dirty="0" err="1"/>
-              <a:t>lgreski</a:t>
-            </a:r>
-            <a:endParaRPr lang="en-US" dirty="0"/>
-          </a:p>
-        </p:txBody>
-      </p:sp>
-      <p:sp>
-        <p:nvSpPr>
-          <p:cNvPr id="9" name="TextBox 8">
-            <a:extLst>
-              <a:ext uri="{FF2B5EF4-FFF2-40B4-BE49-F238E27FC236}">
-                <a16:creationId xmlns:a16="http://schemas.microsoft.com/office/drawing/2014/main" id="{F66CC08F-50EB-9442-9382-9749498C8D6E}"/>
+              <a:rPr lang="en-US" sz="1400" dirty="0"/>
+              <a:t>At small sample sizes,</a:t>
+            </a:r>
+            <a:br>
+              <a:rPr lang="en-US" sz="1400" dirty="0"/>
+            </a:br>
+            <a:r>
+              <a:rPr lang="en-US" sz="1400" dirty="0"/>
+              <a:t>observed p has less</a:t>
+            </a:r>
+            <a:br>
+              <a:rPr lang="en-US" sz="1400" dirty="0"/>
+            </a:br>
+            <a:r>
+              <a:rPr lang="en-US" sz="1400" dirty="0"/>
+              <a:t>variability, leading to </a:t>
+            </a:r>
+            <a:br>
+              <a:rPr lang="en-US" sz="1400" dirty="0"/>
+            </a:br>
+            <a:r>
+              <a:rPr lang="en-US" sz="1400" dirty="0"/>
+              <a:t>higher coverage percentages</a:t>
+            </a:r>
+          </a:p>
+        </p:txBody>
+      </p:sp>
+    </p:spTree>
+    <p:extLst>
+      <p:ext uri="{BB962C8B-B14F-4D97-AF65-F5344CB8AC3E}">
+        <p14:creationId xmlns:p14="http://schemas.microsoft.com/office/powerpoint/2010/main" val="938453523"/>
+      </p:ext>
+    </p:extLst>
+  </p:cSld>
+  <p:clrMapOvr>
+    <a:masterClrMapping/>
+  </p:clrMapOvr>
+</p:sld>
+</file>
+
+<file path=ppt/slides/slide18.xml><?xml version="1.0" encoding="utf-8"?>
+<p:sld xmlns:a="http://schemas.openxmlformats.org/drawingml/2006/main" xmlns:r="http://schemas.openxmlformats.org/officeDocument/2006/relationships" xmlns:p="http://schemas.openxmlformats.org/presentationml/2006/main">
+  <p:cSld>
+    <p:spTree>
+      <p:nvGrpSpPr>
+        <p:cNvPr id="1" name=""/>
+        <p:cNvGrpSpPr/>
+        <p:nvPr/>
+      </p:nvGrpSpPr>
+      <p:grpSpPr>
+        <a:xfrm>
+          <a:off x="0" y="0"/>
+          <a:ext cx="0" cy="0"/>
+          <a:chOff x="0" y="0"/>
+          <a:chExt cx="0" cy="0"/>
+        </a:xfrm>
+      </p:grpSpPr>
+      <p:sp>
+        <p:nvSpPr>
+          <p:cNvPr id="3" name="TextBox 2">
+            <a:extLst>
+              <a:ext uri="{FF2B5EF4-FFF2-40B4-BE49-F238E27FC236}">
+                <a16:creationId xmlns:a16="http://schemas.microsoft.com/office/drawing/2014/main" id="{D639DFBB-76B2-E64D-91BA-C82ACDE98D30}"/>
               </a:ext>
             </a:extLst>
           </p:cNvPr>
@@ -5227,8 +6086,8 @@
         </p:nvSpPr>
         <p:spPr>
           <a:xfrm>
-            <a:off x="1456297" y="4609946"/>
-            <a:ext cx="8690969" cy="369332"/>
+            <a:off x="4526165" y="2967200"/>
+            <a:ext cx="3401893" cy="1569660"/>
           </a:xfrm>
           <a:prstGeom prst="rect">
             <a:avLst/>
@@ -5242,56 +6101,76 @@
           <a:lstStyle/>
           <a:p>
             <a:r>
+              <a:rPr lang="en-US" sz="9600" dirty="0"/>
+              <a:t>Q &amp; A </a:t>
+            </a:r>
+          </a:p>
+        </p:txBody>
+      </p:sp>
+    </p:spTree>
+    <p:extLst>
+      <p:ext uri="{BB962C8B-B14F-4D97-AF65-F5344CB8AC3E}">
+        <p14:creationId xmlns:p14="http://schemas.microsoft.com/office/powerpoint/2010/main" val="3085140371"/>
+      </p:ext>
+    </p:extLst>
+  </p:cSld>
+  <p:clrMapOvr>
+    <a:masterClrMapping/>
+  </p:clrMapOvr>
+</p:sld>
+</file>
+
+<file path=ppt/slides/slide19.xml><?xml version="1.0" encoding="utf-8"?>
+<p:sld xmlns:a="http://schemas.openxmlformats.org/drawingml/2006/main" xmlns:r="http://schemas.openxmlformats.org/officeDocument/2006/relationships" xmlns:p="http://schemas.openxmlformats.org/presentationml/2006/main">
+  <p:cSld>
+    <p:spTree>
+      <p:nvGrpSpPr>
+        <p:cNvPr id="1" name=""/>
+        <p:cNvGrpSpPr/>
+        <p:nvPr/>
+      </p:nvGrpSpPr>
+      <p:grpSpPr>
+        <a:xfrm>
+          <a:off x="0" y="0"/>
+          <a:ext cx="0" cy="0"/>
+          <a:chOff x="0" y="0"/>
+          <a:chExt cx="0" cy="0"/>
+        </a:xfrm>
+      </p:grpSpPr>
+      <p:sp>
+        <p:nvSpPr>
+          <p:cNvPr id="2" name="Title 1">
+            <a:extLst>
+              <a:ext uri="{FF2B5EF4-FFF2-40B4-BE49-F238E27FC236}">
+                <a16:creationId xmlns:a16="http://schemas.microsoft.com/office/drawing/2014/main" id="{B6E12943-F375-9A4E-9A27-CADD138F80A5}"/>
+              </a:ext>
+            </a:extLst>
+          </p:cNvPr>
+          <p:cNvSpPr>
+            <a:spLocks noGrp="1"/>
+          </p:cNvSpPr>
+          <p:nvPr>
+            <p:ph type="title"/>
+          </p:nvPr>
+        </p:nvSpPr>
+        <p:spPr/>
+        <p:txBody>
+          <a:bodyPr/>
+          <a:lstStyle/>
+          <a:p>
+            <a:r>
               <a:rPr lang="en-US" dirty="0"/>
-              <a:t> </a:t>
-            </a:r>
-            <a:r>
-              <a:rPr lang="en-US" dirty="0" err="1"/>
-              <a:t>atl</a:t>
-            </a:r>
-            <a:r>
-              <a:rPr lang="en-US" dirty="0"/>
-              <a:t>-r-users/communications – repository where tonight’s code and presentation are stored </a:t>
-            </a:r>
-          </a:p>
-        </p:txBody>
-      </p:sp>
-      <p:pic>
-        <p:nvPicPr>
-          <p:cNvPr id="10" name="Picture 9">
-            <a:extLst>
-              <a:ext uri="{FF2B5EF4-FFF2-40B4-BE49-F238E27FC236}">
-                <a16:creationId xmlns:a16="http://schemas.microsoft.com/office/drawing/2014/main" id="{939D18BB-69F5-B443-91B0-AB1B112D102A}"/>
-              </a:ext>
-            </a:extLst>
-          </p:cNvPr>
-          <p:cNvPicPr>
-            <a:picLocks noChangeAspect="1"/>
-          </p:cNvPicPr>
-          <p:nvPr/>
-        </p:nvPicPr>
-        <p:blipFill>
-          <a:blip r:embed="rId6"/>
-          <a:stretch>
-            <a:fillRect/>
-          </a:stretch>
-        </p:blipFill>
-        <p:spPr>
-          <a:xfrm>
-            <a:off x="894957" y="5026221"/>
-            <a:ext cx="406400" cy="406400"/>
-          </a:xfrm>
-          <a:prstGeom prst="rect">
-            <a:avLst/>
-          </a:prstGeom>
-        </p:spPr>
-      </p:pic>
-      <p:sp>
-        <p:nvSpPr>
-          <p:cNvPr id="11" name="TextBox 10">
-            <a:extLst>
-              <a:ext uri="{FF2B5EF4-FFF2-40B4-BE49-F238E27FC236}">
-                <a16:creationId xmlns:a16="http://schemas.microsoft.com/office/drawing/2014/main" id="{821E509B-E0B5-984D-8495-D099B3C62B4E}"/>
+              <a:t>References</a:t>
+            </a:r>
+          </a:p>
+        </p:txBody>
+      </p:sp>
+      <p:sp>
+        <p:nvSpPr>
+          <p:cNvPr id="3" name="TextBox 2">
+            <a:extLst>
+              <a:ext uri="{FF2B5EF4-FFF2-40B4-BE49-F238E27FC236}">
+                <a16:creationId xmlns:a16="http://schemas.microsoft.com/office/drawing/2014/main" id="{4C39AB42-EC56-B94E-A94E-9644D979DF28}"/>
               </a:ext>
             </a:extLst>
           </p:cNvPr>
@@ -5300,8 +6179,8 @@
         </p:nvSpPr>
         <p:spPr>
           <a:xfrm>
-            <a:off x="1456297" y="5044755"/>
-            <a:ext cx="838884" cy="369332"/>
+            <a:off x="1127760" y="1828800"/>
+            <a:ext cx="9769406" cy="2246769"/>
           </a:xfrm>
           <a:prstGeom prst="rect">
             <a:avLst/>
@@ -5315,216 +6194,94 @@
           <a:lstStyle/>
           <a:p>
             <a:r>
-              <a:rPr lang="en-US" dirty="0"/>
+              <a:rPr lang="en-US" sz="2000" dirty="0"/>
+              <a:t>Monte Carlo Simulation of Bernoulli Trials (blog article version of this presentation): </a:t>
+            </a:r>
+            <a:br>
+              <a:rPr lang="en-US" sz="2000" dirty="0"/>
+            </a:br>
+            <a:r>
+              <a:rPr lang="en-US" sz="2000" dirty="0">
+                <a:hlinkClick r:id="rId2"/>
+              </a:rPr>
+              <a:t>http://bit.ly/2PicLJN</a:t>
+            </a:r>
+            <a:r>
+              <a:rPr lang="en-US" sz="2000" dirty="0"/>
               <a:t> </a:t>
             </a:r>
-            <a:r>
-              <a:rPr lang="en-US" dirty="0" err="1"/>
-              <a:t>lgreski</a:t>
-            </a:r>
-            <a:endParaRPr lang="en-US" dirty="0"/>
-          </a:p>
-        </p:txBody>
-      </p:sp>
-      <p:pic>
-        <p:nvPicPr>
-          <p:cNvPr id="12" name="Picture 11">
-            <a:extLst>
-              <a:ext uri="{FF2B5EF4-FFF2-40B4-BE49-F238E27FC236}">
-                <a16:creationId xmlns:a16="http://schemas.microsoft.com/office/drawing/2014/main" id="{E258D6E7-31DF-B841-B3A5-67880E34E6C6}"/>
-              </a:ext>
-            </a:extLst>
-          </p:cNvPr>
-          <p:cNvPicPr>
-            <a:picLocks noChangeAspect="1"/>
-          </p:cNvPicPr>
-          <p:nvPr/>
-        </p:nvPicPr>
-        <p:blipFill>
-          <a:blip r:embed="rId7"/>
-          <a:stretch>
-            <a:fillRect/>
-          </a:stretch>
-        </p:blipFill>
-        <p:spPr>
-          <a:xfrm>
-            <a:off x="822013" y="5531999"/>
-            <a:ext cx="537047" cy="537047"/>
-          </a:xfrm>
-          <a:prstGeom prst="rect">
-            <a:avLst/>
-          </a:prstGeom>
-        </p:spPr>
-      </p:pic>
-      <p:sp>
-        <p:nvSpPr>
-          <p:cNvPr id="13" name="TextBox 12">
-            <a:extLst>
-              <a:ext uri="{FF2B5EF4-FFF2-40B4-BE49-F238E27FC236}">
-                <a16:creationId xmlns:a16="http://schemas.microsoft.com/office/drawing/2014/main" id="{C7BC55D7-BE16-0543-9D90-8400CC766953}"/>
-              </a:ext>
-            </a:extLst>
-          </p:cNvPr>
-          <p:cNvSpPr txBox="1"/>
-          <p:nvPr/>
-        </p:nvSpPr>
-        <p:spPr>
-          <a:xfrm>
-            <a:off x="1456297" y="5615856"/>
-            <a:ext cx="6703182" cy="369332"/>
-          </a:xfrm>
-          <a:prstGeom prst="rect">
-            <a:avLst/>
-          </a:prstGeom>
-          <a:noFill/>
-        </p:spPr>
-        <p:txBody>
-          <a:bodyPr wrap="none" rtlCol="0">
-            <a:spAutoFit/>
-          </a:bodyPr>
-          <a:lstStyle/>
-          <a:p>
-            <a:r>
-              <a:rPr lang="en-US" dirty="0"/>
-              <a:t> Data Science Depot blog: </a:t>
-            </a:r>
-            <a:r>
-              <a:rPr lang="en-US" dirty="0">
-                <a:hlinkClick r:id="rId8"/>
+          </a:p>
+          <a:p>
+            <a:endParaRPr lang="en-US" sz="2000" dirty="0"/>
+          </a:p>
+          <a:p>
+            <a:r>
+              <a:rPr lang="en-US" sz="2000" dirty="0"/>
+              <a:t>Coverage probability for confidence interval (</a:t>
+            </a:r>
+            <a:r>
+              <a:rPr lang="en-US" sz="2000" dirty="0" err="1"/>
+              <a:t>Stackoverflow</a:t>
+            </a:r>
+            <a:r>
+              <a:rPr lang="en-US" sz="2000" dirty="0"/>
+              <a:t> question): </a:t>
+            </a:r>
+            <a:r>
+              <a:rPr lang="en-US" sz="2000" dirty="0">
+                <a:hlinkClick r:id="rId3"/>
               </a:rPr>
-              <a:t>https://lgreski.github.io/datasciencedepot/</a:t>
-            </a:r>
-            <a:r>
-              <a:rPr lang="en-US" dirty="0"/>
+              <a:t>https://bit.ly/33l04lC</a:t>
+            </a:r>
+            <a:r>
+              <a:rPr lang="en-US" sz="2000" dirty="0"/>
               <a:t> </a:t>
             </a:r>
           </a:p>
-        </p:txBody>
-      </p:sp>
-      <p:sp>
-        <p:nvSpPr>
-          <p:cNvPr id="14" name="TextBox 13">
-            <a:extLst>
-              <a:ext uri="{FF2B5EF4-FFF2-40B4-BE49-F238E27FC236}">
-                <a16:creationId xmlns:a16="http://schemas.microsoft.com/office/drawing/2014/main" id="{A9F10A48-1AA5-F144-818F-BACDFEE8248C}"/>
-              </a:ext>
-            </a:extLst>
-          </p:cNvPr>
-          <p:cNvSpPr txBox="1"/>
-          <p:nvPr/>
-        </p:nvSpPr>
-        <p:spPr>
-          <a:xfrm>
-            <a:off x="2865120" y="1384844"/>
-            <a:ext cx="8883009" cy="2308324"/>
-          </a:xfrm>
-          <a:prstGeom prst="rect">
-            <a:avLst/>
-          </a:prstGeom>
-          <a:noFill/>
-        </p:spPr>
-        <p:txBody>
-          <a:bodyPr wrap="none" rtlCol="0">
-            <a:spAutoFit/>
-          </a:bodyPr>
-          <a:lstStyle/>
-          <a:p>
-            <a:r>
-              <a:rPr lang="en-US" dirty="0"/>
-              <a:t>Len Greski currently serves as Principal Consultant at LeadingAgile, the leader in helping large</a:t>
+          <a:p>
+            <a:endParaRPr lang="en-US" sz="2000" dirty="0"/>
+          </a:p>
+          <a:p>
+            <a:r>
+              <a:rPr lang="en-US" sz="2000" i="1" dirty="0"/>
+              <a:t>Estimating Completion Rates from Small Sample Sizes Using Binomial</a:t>
             </a:r>
             <a:br>
-              <a:rPr lang="en-US" dirty="0"/>
+              <a:rPr lang="en-US" sz="2000" i="1" dirty="0"/>
             </a:br>
             <a:r>
-              <a:rPr lang="en-US" dirty="0"/>
-              <a:t>companies generate economic value through agile transformation. Len started his </a:t>
-            </a:r>
-            <a:br>
-              <a:rPr lang="en-US" dirty="0"/>
-            </a:br>
-            <a:r>
-              <a:rPr lang="en-US" dirty="0"/>
-              <a:t>career at Information Resources Inc., developing statistical and AI models to predict</a:t>
-            </a:r>
-            <a:br>
-              <a:rPr lang="en-US" dirty="0"/>
-            </a:br>
-            <a:r>
-              <a:rPr lang="en-US" dirty="0"/>
-              <a:t>consumer behavior. He learned R in 2015 when he needed a way to analyze the value of a </a:t>
-            </a:r>
-            <a:br>
-              <a:rPr lang="en-US" dirty="0"/>
-            </a:br>
-            <a:r>
-              <a:rPr lang="en-US" dirty="0"/>
-              <a:t>software portfolio without spending $9,000 on a copy of SAS.  Len has mentored hundreds </a:t>
-            </a:r>
-          </a:p>
-          <a:p>
-            <a:r>
-              <a:rPr lang="en-US" dirty="0"/>
-              <a:t>of thousands of students in the Johns Hopkins University Data Science Specialization on </a:t>
-            </a:r>
-          </a:p>
-          <a:p>
-            <a:r>
-              <a:rPr lang="en-US" dirty="0"/>
-              <a:t>Coursera, having served as a Community Mentor since 2015.  Len has a top 5% </a:t>
-            </a:r>
-            <a:br>
-              <a:rPr lang="en-US" dirty="0"/>
-            </a:br>
-            <a:r>
-              <a:rPr lang="en-US" dirty="0"/>
-              <a:t>ranking on </a:t>
-            </a:r>
-            <a:r>
-              <a:rPr lang="en-US" dirty="0" err="1"/>
-              <a:t>Stackoverflow.com</a:t>
-            </a:r>
-            <a:r>
-              <a:rPr lang="en-US" dirty="0"/>
-              <a:t>, where he primarily answers questions about R. </a:t>
-            </a:r>
-          </a:p>
-        </p:txBody>
-      </p:sp>
-      <p:pic>
-        <p:nvPicPr>
-          <p:cNvPr id="15" name="Picture 14">
-            <a:extLst>
-              <a:ext uri="{FF2B5EF4-FFF2-40B4-BE49-F238E27FC236}">
-                <a16:creationId xmlns:a16="http://schemas.microsoft.com/office/drawing/2014/main" id="{7BC9C847-7C77-4C44-8CB7-A571842D5092}"/>
-              </a:ext>
-            </a:extLst>
-          </p:cNvPr>
-          <p:cNvPicPr>
-            <a:picLocks noChangeAspect="1"/>
-          </p:cNvPicPr>
-          <p:nvPr/>
-        </p:nvPicPr>
-        <p:blipFill>
-          <a:blip r:embed="rId9"/>
-          <a:stretch>
-            <a:fillRect/>
-          </a:stretch>
-        </p:blipFill>
-        <p:spPr>
-          <a:xfrm>
-            <a:off x="803811" y="6115199"/>
-            <a:ext cx="2013926" cy="537047"/>
-          </a:xfrm>
-          <a:prstGeom prst="rect">
-            <a:avLst/>
-          </a:prstGeom>
-        </p:spPr>
-      </p:pic>
+              <a:rPr lang="en-US" sz="2000" i="1" dirty="0"/>
+              <a:t>Confidence Intervals</a:t>
+            </a:r>
+            <a:r>
+              <a:rPr lang="en-US" sz="2000" dirty="0"/>
+              <a:t>, </a:t>
+            </a:r>
+            <a:r>
+              <a:rPr lang="en-US" sz="2000" dirty="0" err="1"/>
+              <a:t>Sauro</a:t>
+            </a:r>
+            <a:r>
+              <a:rPr lang="en-US" sz="2000" dirty="0"/>
+              <a:t> &amp; Lewis 2005: </a:t>
+            </a:r>
+            <a:r>
+              <a:rPr lang="en-US" sz="2000" dirty="0">
+                <a:hlinkClick r:id="rId4"/>
+              </a:rPr>
+              <a:t>http://bit.ly/estimatingCoverageRates</a:t>
+            </a:r>
+            <a:r>
+              <a:rPr lang="en-US" sz="2000" dirty="0"/>
+              <a:t> </a:t>
+            </a:r>
+          </a:p>
+        </p:txBody>
+      </p:sp>
     </p:spTree>
     <p:extLst>
       <p:ext uri="{BB962C8B-B14F-4D97-AF65-F5344CB8AC3E}">
-        <p14:creationId xmlns:p14="http://schemas.microsoft.com/office/powerpoint/2010/main" val="3418446521"/>
+        <p14:creationId xmlns:p14="http://schemas.microsoft.com/office/powerpoint/2010/main" val="2291217490"/>
       </p:ext>
     </p:extLst>
   </p:cSld>
@@ -5581,38 +6338,10 @@
       </p:sp>
       <p:sp>
         <p:nvSpPr>
-          <p:cNvPr id="3" name="Content Placeholder 2">
-            <a:extLst>
-              <a:ext uri="{FF2B5EF4-FFF2-40B4-BE49-F238E27FC236}">
-                <a16:creationId xmlns:a16="http://schemas.microsoft.com/office/drawing/2014/main" id="{B7806C29-6E7B-324E-8E83-7C27A279D2B4}"/>
-              </a:ext>
-            </a:extLst>
-          </p:cNvPr>
-          <p:cNvSpPr>
-            <a:spLocks noGrp="1"/>
-          </p:cNvSpPr>
-          <p:nvPr>
-            <p:ph idx="1"/>
-          </p:nvPr>
-        </p:nvSpPr>
-        <p:spPr/>
-        <p:txBody>
-          <a:bodyPr/>
-          <a:lstStyle/>
-          <a:p>
-            <a:r>
-              <a:rPr lang="en-US" dirty="0"/>
-              <a:t>Explain Binomial Trials, Wald Confidence Intervals, Monte Carlo Simulation </a:t>
-            </a:r>
-          </a:p>
-        </p:txBody>
-      </p:sp>
-      <p:sp>
-        <p:nvSpPr>
-          <p:cNvPr id="4" name="TextBox 3">
-            <a:extLst>
-              <a:ext uri="{FF2B5EF4-FFF2-40B4-BE49-F238E27FC236}">
-                <a16:creationId xmlns:a16="http://schemas.microsoft.com/office/drawing/2014/main" id="{D3639D1F-36A2-AA41-BB27-FA0C49A1E99D}"/>
+          <p:cNvPr id="5" name="TextBox 4">
+            <a:extLst>
+              <a:ext uri="{FF2B5EF4-FFF2-40B4-BE49-F238E27FC236}">
+                <a16:creationId xmlns:a16="http://schemas.microsoft.com/office/drawing/2014/main" id="{92DAC30C-2D36-7B42-9D46-7D611D8225C8}"/>
               </a:ext>
             </a:extLst>
           </p:cNvPr>
@@ -5620,9 +6349,9 @@
           <p:nvPr/>
         </p:nvSpPr>
         <p:spPr>
-          <a:xfrm rot="19399479">
-            <a:off x="4511848" y="3474720"/>
-            <a:ext cx="3168303" cy="646331"/>
+          <a:xfrm>
+            <a:off x="1051560" y="1325880"/>
+            <a:ext cx="9839168" cy="707886"/>
           </a:xfrm>
           <a:prstGeom prst="rect">
             <a:avLst/>
@@ -5636,12 +6365,411 @@
           <a:lstStyle/>
           <a:p>
             <a:r>
-              <a:rPr lang="en-US" sz="3600" dirty="0">
-                <a:solidFill>
-                  <a:srgbClr val="FF0000"/>
-                </a:solidFill>
-              </a:rPr>
-              <a:t>Work in Process</a:t>
+              <a:rPr lang="en-US" sz="2000" dirty="0"/>
+              <a:t>A user on </a:t>
+            </a:r>
+            <a:r>
+              <a:rPr lang="en-US" sz="2000" dirty="0" err="1"/>
+              <a:t>Stackoverflow</a:t>
+            </a:r>
+            <a:r>
+              <a:rPr lang="en-US" sz="2000" dirty="0"/>
+              <a:t> wanted to calculate coverage probabilities for sets of Bernoulli Trials</a:t>
+            </a:r>
+            <a:br>
+              <a:rPr lang="en-US" sz="2000" dirty="0"/>
+            </a:br>
+            <a:r>
+              <a:rPr lang="en-US" sz="2000" dirty="0"/>
+              <a:t>at varying sample sizes and expected probability values.  </a:t>
+            </a:r>
+          </a:p>
+        </p:txBody>
+      </p:sp>
+      <p:sp>
+        <p:nvSpPr>
+          <p:cNvPr id="3" name="TextBox 2">
+            <a:extLst>
+              <a:ext uri="{FF2B5EF4-FFF2-40B4-BE49-F238E27FC236}">
+                <a16:creationId xmlns:a16="http://schemas.microsoft.com/office/drawing/2014/main" id="{E7C814FC-BD2F-8548-8AAC-ABE7843F50DB}"/>
+              </a:ext>
+            </a:extLst>
+          </p:cNvPr>
+          <p:cNvSpPr txBox="1"/>
+          <p:nvPr/>
+        </p:nvSpPr>
+        <p:spPr>
+          <a:xfrm>
+            <a:off x="1249680" y="2423160"/>
+            <a:ext cx="1592231" cy="369332"/>
+          </a:xfrm>
+          <a:prstGeom prst="rect">
+            <a:avLst/>
+          </a:prstGeom>
+          <a:noFill/>
+        </p:spPr>
+        <p:txBody>
+          <a:bodyPr wrap="none" rtlCol="0">
+            <a:spAutoFit/>
+          </a:bodyPr>
+          <a:lstStyle/>
+          <a:p>
+            <a:r>
+              <a:rPr lang="en-US" b="1" dirty="0"/>
+              <a:t>Bernoulli Trial:</a:t>
+            </a:r>
+          </a:p>
+        </p:txBody>
+      </p:sp>
+      <p:sp>
+        <p:nvSpPr>
+          <p:cNvPr id="6" name="TextBox 5">
+            <a:extLst>
+              <a:ext uri="{FF2B5EF4-FFF2-40B4-BE49-F238E27FC236}">
+                <a16:creationId xmlns:a16="http://schemas.microsoft.com/office/drawing/2014/main" id="{CACA22DF-526F-4B41-9C38-8A4C1809BF24}"/>
+              </a:ext>
+            </a:extLst>
+          </p:cNvPr>
+          <p:cNvSpPr txBox="1"/>
+          <p:nvPr/>
+        </p:nvSpPr>
+        <p:spPr>
+          <a:xfrm>
+            <a:off x="2841911" y="2423160"/>
+            <a:ext cx="7765129" cy="646331"/>
+          </a:xfrm>
+          <a:prstGeom prst="rect">
+            <a:avLst/>
+          </a:prstGeom>
+          <a:noFill/>
+        </p:spPr>
+        <p:txBody>
+          <a:bodyPr wrap="square" rtlCol="0">
+            <a:spAutoFit/>
+          </a:bodyPr>
+          <a:lstStyle/>
+          <a:p>
+            <a:r>
+              <a:rPr lang="en-US" dirty="0"/>
+              <a:t>A random experiment with two possible outcomes where probability of success</a:t>
+            </a:r>
+            <a:br>
+              <a:rPr lang="en-US" dirty="0"/>
+            </a:br>
+            <a:r>
+              <a:rPr lang="en-US" dirty="0"/>
+              <a:t>is the same every time the experiment is conducted </a:t>
+            </a:r>
+          </a:p>
+        </p:txBody>
+      </p:sp>
+      <p:sp>
+        <p:nvSpPr>
+          <p:cNvPr id="7" name="TextBox 6">
+            <a:extLst>
+              <a:ext uri="{FF2B5EF4-FFF2-40B4-BE49-F238E27FC236}">
+                <a16:creationId xmlns:a16="http://schemas.microsoft.com/office/drawing/2014/main" id="{F99460BD-12E7-DB4E-AA86-ADD37F19329F}"/>
+              </a:ext>
+            </a:extLst>
+          </p:cNvPr>
+          <p:cNvSpPr txBox="1"/>
+          <p:nvPr/>
+        </p:nvSpPr>
+        <p:spPr>
+          <a:xfrm>
+            <a:off x="1249680" y="3166646"/>
+            <a:ext cx="1373966" cy="646331"/>
+          </a:xfrm>
+          <a:prstGeom prst="rect">
+            <a:avLst/>
+          </a:prstGeom>
+          <a:noFill/>
+        </p:spPr>
+        <p:txBody>
+          <a:bodyPr wrap="none" rtlCol="0">
+            <a:spAutoFit/>
+          </a:bodyPr>
+          <a:lstStyle/>
+          <a:p>
+            <a:r>
+              <a:rPr lang="en-US" b="1" dirty="0"/>
+              <a:t>Monte Carlo</a:t>
+            </a:r>
+            <a:br>
+              <a:rPr lang="en-US" b="1" dirty="0"/>
+            </a:br>
+            <a:r>
+              <a:rPr lang="en-US" b="1" dirty="0"/>
+              <a:t>Method:</a:t>
+            </a:r>
+          </a:p>
+        </p:txBody>
+      </p:sp>
+      <p:sp>
+        <p:nvSpPr>
+          <p:cNvPr id="8" name="TextBox 7">
+            <a:extLst>
+              <a:ext uri="{FF2B5EF4-FFF2-40B4-BE49-F238E27FC236}">
+                <a16:creationId xmlns:a16="http://schemas.microsoft.com/office/drawing/2014/main" id="{4299F797-6236-2E47-B9CF-B7D207ABF5A8}"/>
+              </a:ext>
+            </a:extLst>
+          </p:cNvPr>
+          <p:cNvSpPr txBox="1"/>
+          <p:nvPr/>
+        </p:nvSpPr>
+        <p:spPr>
+          <a:xfrm>
+            <a:off x="2841911" y="3166646"/>
+            <a:ext cx="7765129" cy="646331"/>
+          </a:xfrm>
+          <a:prstGeom prst="rect">
+            <a:avLst/>
+          </a:prstGeom>
+          <a:noFill/>
+        </p:spPr>
+        <p:txBody>
+          <a:bodyPr wrap="square" rtlCol="0">
+            <a:spAutoFit/>
+          </a:bodyPr>
+          <a:lstStyle/>
+          <a:p>
+            <a:r>
+              <a:rPr lang="en-US" dirty="0"/>
+              <a:t>A class of computational algorithms that rely on repeated random sampling to</a:t>
+            </a:r>
+            <a:br>
+              <a:rPr lang="en-US" dirty="0"/>
+            </a:br>
+            <a:r>
+              <a:rPr lang="en-US" dirty="0"/>
+              <a:t>obtain numerical results</a:t>
+            </a:r>
+          </a:p>
+        </p:txBody>
+      </p:sp>
+      <p:sp>
+        <p:nvSpPr>
+          <p:cNvPr id="9" name="TextBox 8">
+            <a:extLst>
+              <a:ext uri="{FF2B5EF4-FFF2-40B4-BE49-F238E27FC236}">
+                <a16:creationId xmlns:a16="http://schemas.microsoft.com/office/drawing/2014/main" id="{F693903A-9A9D-5B44-8EDB-3BB5B160A3C7}"/>
+              </a:ext>
+            </a:extLst>
+          </p:cNvPr>
+          <p:cNvSpPr txBox="1"/>
+          <p:nvPr/>
+        </p:nvSpPr>
+        <p:spPr>
+          <a:xfrm>
+            <a:off x="1249680" y="4015920"/>
+            <a:ext cx="1292726" cy="646331"/>
+          </a:xfrm>
+          <a:prstGeom prst="rect">
+            <a:avLst/>
+          </a:prstGeom>
+          <a:noFill/>
+        </p:spPr>
+        <p:txBody>
+          <a:bodyPr wrap="none" rtlCol="0">
+            <a:spAutoFit/>
+          </a:bodyPr>
+          <a:lstStyle/>
+          <a:p>
+            <a:r>
+              <a:rPr lang="en-US" b="1" dirty="0"/>
+              <a:t>Coverage</a:t>
+            </a:r>
+            <a:br>
+              <a:rPr lang="en-US" b="1" dirty="0"/>
+            </a:br>
+            <a:r>
+              <a:rPr lang="en-US" b="1" dirty="0"/>
+              <a:t>Probability:</a:t>
+            </a:r>
+          </a:p>
+        </p:txBody>
+      </p:sp>
+      <p:sp>
+        <p:nvSpPr>
+          <p:cNvPr id="10" name="TextBox 9">
+            <a:extLst>
+              <a:ext uri="{FF2B5EF4-FFF2-40B4-BE49-F238E27FC236}">
+                <a16:creationId xmlns:a16="http://schemas.microsoft.com/office/drawing/2014/main" id="{F89F7596-7ABE-F84A-A35E-608854D85CE4}"/>
+              </a:ext>
+            </a:extLst>
+          </p:cNvPr>
+          <p:cNvSpPr txBox="1"/>
+          <p:nvPr/>
+        </p:nvSpPr>
+        <p:spPr>
+          <a:xfrm>
+            <a:off x="2841911" y="4015920"/>
+            <a:ext cx="7765129" cy="646331"/>
+          </a:xfrm>
+          <a:prstGeom prst="rect">
+            <a:avLst/>
+          </a:prstGeom>
+          <a:noFill/>
+        </p:spPr>
+        <p:txBody>
+          <a:bodyPr wrap="square" rtlCol="0">
+            <a:spAutoFit/>
+          </a:bodyPr>
+          <a:lstStyle/>
+          <a:p>
+            <a:r>
+              <a:rPr lang="en-US" dirty="0"/>
+              <a:t>Proportion of trials of sample size &lt;n&gt; within a confidence interval that contains</a:t>
+            </a:r>
+            <a:br>
+              <a:rPr lang="en-US" dirty="0"/>
+            </a:br>
+            <a:r>
+              <a:rPr lang="en-US" dirty="0"/>
+              <a:t>the true value for the population 95% of the time (for a 95% confidence interval)  </a:t>
+            </a:r>
+          </a:p>
+        </p:txBody>
+      </p:sp>
+      <p:sp>
+        <p:nvSpPr>
+          <p:cNvPr id="11" name="TextBox 10">
+            <a:extLst>
+              <a:ext uri="{FF2B5EF4-FFF2-40B4-BE49-F238E27FC236}">
+                <a16:creationId xmlns:a16="http://schemas.microsoft.com/office/drawing/2014/main" id="{C7E36F7C-D623-534B-A43F-7D615BB9F440}"/>
+              </a:ext>
+            </a:extLst>
+          </p:cNvPr>
+          <p:cNvSpPr txBox="1"/>
+          <p:nvPr/>
+        </p:nvSpPr>
+        <p:spPr>
+          <a:xfrm>
+            <a:off x="1249680" y="4865194"/>
+            <a:ext cx="1562928" cy="369332"/>
+          </a:xfrm>
+          <a:prstGeom prst="rect">
+            <a:avLst/>
+          </a:prstGeom>
+          <a:noFill/>
+        </p:spPr>
+        <p:txBody>
+          <a:bodyPr wrap="none" rtlCol="0">
+            <a:spAutoFit/>
+          </a:bodyPr>
+          <a:lstStyle/>
+          <a:p>
+            <a:r>
+              <a:rPr lang="en-US" b="1" dirty="0"/>
+              <a:t>Wald Method:</a:t>
+            </a:r>
+          </a:p>
+        </p:txBody>
+      </p:sp>
+      <p:sp>
+        <p:nvSpPr>
+          <p:cNvPr id="12" name="TextBox 11">
+            <a:extLst>
+              <a:ext uri="{FF2B5EF4-FFF2-40B4-BE49-F238E27FC236}">
+                <a16:creationId xmlns:a16="http://schemas.microsoft.com/office/drawing/2014/main" id="{8D504948-3C72-1943-A45C-E4BDB5CAE79A}"/>
+              </a:ext>
+            </a:extLst>
+          </p:cNvPr>
+          <p:cNvSpPr txBox="1"/>
+          <p:nvPr/>
+        </p:nvSpPr>
+        <p:spPr>
+          <a:xfrm>
+            <a:off x="2841911" y="4865194"/>
+            <a:ext cx="8048817" cy="646331"/>
+          </a:xfrm>
+          <a:prstGeom prst="rect">
+            <a:avLst/>
+          </a:prstGeom>
+          <a:noFill/>
+        </p:spPr>
+        <p:txBody>
+          <a:bodyPr wrap="square" rtlCol="0">
+            <a:spAutoFit/>
+          </a:bodyPr>
+          <a:lstStyle/>
+          <a:p>
+            <a:r>
+              <a:rPr lang="en-US" dirty="0"/>
+              <a:t>The most commonly presented formula for calculating binomial confidence intervals, calculated as: </a:t>
+            </a:r>
+          </a:p>
+        </p:txBody>
+      </p:sp>
+      <p:pic>
+        <p:nvPicPr>
+          <p:cNvPr id="4" name="Picture 3">
+            <a:extLst>
+              <a:ext uri="{FF2B5EF4-FFF2-40B4-BE49-F238E27FC236}">
+                <a16:creationId xmlns:a16="http://schemas.microsoft.com/office/drawing/2014/main" id="{3978717F-6F16-9640-B2B0-44505FEEE0BA}"/>
+              </a:ext>
+            </a:extLst>
+          </p:cNvPr>
+          <p:cNvPicPr>
+            <a:picLocks noChangeAspect="1"/>
+          </p:cNvPicPr>
+          <p:nvPr/>
+        </p:nvPicPr>
+        <p:blipFill>
+          <a:blip r:embed="rId2"/>
+          <a:stretch>
+            <a:fillRect/>
+          </a:stretch>
+        </p:blipFill>
+        <p:spPr>
+          <a:xfrm>
+            <a:off x="5217160" y="5191845"/>
+            <a:ext cx="2489200" cy="444500"/>
+          </a:xfrm>
+          <a:prstGeom prst="rect">
+            <a:avLst/>
+          </a:prstGeom>
+        </p:spPr>
+      </p:pic>
+      <p:sp>
+        <p:nvSpPr>
+          <p:cNvPr id="13" name="TextBox 12">
+            <a:extLst>
+              <a:ext uri="{FF2B5EF4-FFF2-40B4-BE49-F238E27FC236}">
+                <a16:creationId xmlns:a16="http://schemas.microsoft.com/office/drawing/2014/main" id="{BAADAE7F-01FF-6F41-ABEC-4758463478F2}"/>
+              </a:ext>
+            </a:extLst>
+          </p:cNvPr>
+          <p:cNvSpPr txBox="1"/>
+          <p:nvPr/>
+        </p:nvSpPr>
+        <p:spPr>
+          <a:xfrm>
+            <a:off x="1249680" y="6213193"/>
+            <a:ext cx="3337260" cy="369332"/>
+          </a:xfrm>
+          <a:prstGeom prst="rect">
+            <a:avLst/>
+          </a:prstGeom>
+          <a:noFill/>
+        </p:spPr>
+        <p:txBody>
+          <a:bodyPr wrap="none" rtlCol="0">
+            <a:spAutoFit/>
+          </a:bodyPr>
+          <a:lstStyle/>
+          <a:p>
+            <a:r>
+              <a:rPr lang="en-US" dirty="0"/>
+              <a:t>Reference: </a:t>
+            </a:r>
+            <a:r>
+              <a:rPr lang="en-US" dirty="0" err="1"/>
+              <a:t>Sauro</a:t>
+            </a:r>
+            <a:r>
+              <a:rPr lang="en-US" dirty="0"/>
+              <a:t> and Lewis, 2005</a:t>
             </a:r>
           </a:p>
         </p:txBody>
@@ -5650,6 +6778,544 @@
     <p:extLst>
       <p:ext uri="{BB962C8B-B14F-4D97-AF65-F5344CB8AC3E}">
         <p14:creationId xmlns:p14="http://schemas.microsoft.com/office/powerpoint/2010/main" val="2609070742"/>
+      </p:ext>
+    </p:extLst>
+  </p:cSld>
+  <p:clrMapOvr>
+    <a:masterClrMapping/>
+  </p:clrMapOvr>
+</p:sld>
+</file>
+
+<file path=ppt/slides/slide20.xml><?xml version="1.0" encoding="utf-8"?>
+<p:sld xmlns:a="http://schemas.openxmlformats.org/drawingml/2006/main" xmlns:r="http://schemas.openxmlformats.org/officeDocument/2006/relationships" xmlns:p="http://schemas.openxmlformats.org/presentationml/2006/main">
+  <p:cSld>
+    <p:spTree>
+      <p:nvGrpSpPr>
+        <p:cNvPr id="1" name=""/>
+        <p:cNvGrpSpPr/>
+        <p:nvPr/>
+      </p:nvGrpSpPr>
+      <p:grpSpPr>
+        <a:xfrm>
+          <a:off x="0" y="0"/>
+          <a:ext cx="0" cy="0"/>
+          <a:chOff x="0" y="0"/>
+          <a:chExt cx="0" cy="0"/>
+        </a:xfrm>
+      </p:grpSpPr>
+      <p:sp>
+        <p:nvSpPr>
+          <p:cNvPr id="2" name="Title 1">
+            <a:extLst>
+              <a:ext uri="{FF2B5EF4-FFF2-40B4-BE49-F238E27FC236}">
+                <a16:creationId xmlns:a16="http://schemas.microsoft.com/office/drawing/2014/main" id="{6092EAB6-FFEF-B54D-886F-29B8FBD73691}"/>
+              </a:ext>
+            </a:extLst>
+          </p:cNvPr>
+          <p:cNvSpPr>
+            <a:spLocks noGrp="1"/>
+          </p:cNvSpPr>
+          <p:nvPr>
+            <p:ph type="title"/>
+          </p:nvPr>
+        </p:nvSpPr>
+        <p:spPr/>
+        <p:txBody>
+          <a:bodyPr/>
+          <a:lstStyle/>
+          <a:p>
+            <a:r>
+              <a:rPr lang="en-US" dirty="0"/>
+              <a:t>About Len</a:t>
+            </a:r>
+          </a:p>
+        </p:txBody>
+      </p:sp>
+      <p:pic>
+        <p:nvPicPr>
+          <p:cNvPr id="4" name="Picture 3">
+            <a:extLst>
+              <a:ext uri="{FF2B5EF4-FFF2-40B4-BE49-F238E27FC236}">
+                <a16:creationId xmlns:a16="http://schemas.microsoft.com/office/drawing/2014/main" id="{F5842CDC-9BCF-ED4A-B142-F82CFFC48374}"/>
+              </a:ext>
+            </a:extLst>
+          </p:cNvPr>
+          <p:cNvPicPr>
+            <a:picLocks noChangeAspect="1"/>
+          </p:cNvPicPr>
+          <p:nvPr/>
+        </p:nvPicPr>
+        <p:blipFill>
+          <a:blip r:embed="rId3"/>
+          <a:stretch>
+            <a:fillRect/>
+          </a:stretch>
+        </p:blipFill>
+        <p:spPr>
+          <a:xfrm>
+            <a:off x="838200" y="1487692"/>
+            <a:ext cx="1828800" cy="1848679"/>
+          </a:xfrm>
+          <a:prstGeom prst="rect">
+            <a:avLst/>
+          </a:prstGeom>
+        </p:spPr>
+      </p:pic>
+      <p:sp>
+        <p:nvSpPr>
+          <p:cNvPr id="5" name="TextBox 4">
+            <a:extLst>
+              <a:ext uri="{FF2B5EF4-FFF2-40B4-BE49-F238E27FC236}">
+                <a16:creationId xmlns:a16="http://schemas.microsoft.com/office/drawing/2014/main" id="{6414056E-90F6-7344-ACA0-21B67F079388}"/>
+              </a:ext>
+            </a:extLst>
+          </p:cNvPr>
+          <p:cNvSpPr txBox="1"/>
+          <p:nvPr/>
+        </p:nvSpPr>
+        <p:spPr>
+          <a:xfrm>
+            <a:off x="1456297" y="3810270"/>
+            <a:ext cx="2116605" cy="369332"/>
+          </a:xfrm>
+          <a:prstGeom prst="rect">
+            <a:avLst/>
+          </a:prstGeom>
+          <a:noFill/>
+        </p:spPr>
+        <p:txBody>
+          <a:bodyPr wrap="none" rtlCol="0">
+            <a:spAutoFit/>
+          </a:bodyPr>
+          <a:lstStyle/>
+          <a:p>
+            <a:r>
+              <a:rPr lang="en-US" dirty="0"/>
+              <a:t> </a:t>
+            </a:r>
+            <a:r>
+              <a:rPr lang="en-US" dirty="0">
+                <a:hlinkClick r:id="rId4"/>
+              </a:rPr>
+              <a:t>len@greskilabs.com</a:t>
+            </a:r>
+            <a:endParaRPr lang="en-US" dirty="0"/>
+          </a:p>
+        </p:txBody>
+      </p:sp>
+      <p:pic>
+        <p:nvPicPr>
+          <p:cNvPr id="6" name="Picture 5">
+            <a:extLst>
+              <a:ext uri="{FF2B5EF4-FFF2-40B4-BE49-F238E27FC236}">
+                <a16:creationId xmlns:a16="http://schemas.microsoft.com/office/drawing/2014/main" id="{C78A498D-59ED-254A-8EA3-0F3D3158DAB6}"/>
+              </a:ext>
+            </a:extLst>
+          </p:cNvPr>
+          <p:cNvPicPr>
+            <a:picLocks noChangeAspect="1"/>
+          </p:cNvPicPr>
+          <p:nvPr/>
+        </p:nvPicPr>
+        <p:blipFill>
+          <a:blip r:embed="rId5"/>
+          <a:stretch>
+            <a:fillRect/>
+          </a:stretch>
+        </p:blipFill>
+        <p:spPr>
+          <a:xfrm>
+            <a:off x="912737" y="4410881"/>
+            <a:ext cx="355600" cy="368300"/>
+          </a:xfrm>
+          <a:prstGeom prst="rect">
+            <a:avLst/>
+          </a:prstGeom>
+        </p:spPr>
+      </p:pic>
+      <p:pic>
+        <p:nvPicPr>
+          <p:cNvPr id="7" name="Picture 6">
+            <a:extLst>
+              <a:ext uri="{FF2B5EF4-FFF2-40B4-BE49-F238E27FC236}">
+                <a16:creationId xmlns:a16="http://schemas.microsoft.com/office/drawing/2014/main" id="{8564C8CC-7A1B-5848-BB26-0560A3F83B9A}"/>
+              </a:ext>
+            </a:extLst>
+          </p:cNvPr>
+          <p:cNvPicPr>
+            <a:picLocks noChangeAspect="1"/>
+          </p:cNvPicPr>
+          <p:nvPr/>
+        </p:nvPicPr>
+        <p:blipFill>
+          <a:blip r:embed="rId6"/>
+          <a:stretch>
+            <a:fillRect/>
+          </a:stretch>
+        </p:blipFill>
+        <p:spPr>
+          <a:xfrm>
+            <a:off x="882257" y="3810270"/>
+            <a:ext cx="419100" cy="419100"/>
+          </a:xfrm>
+          <a:prstGeom prst="rect">
+            <a:avLst/>
+          </a:prstGeom>
+        </p:spPr>
+      </p:pic>
+      <p:sp>
+        <p:nvSpPr>
+          <p:cNvPr id="8" name="TextBox 7">
+            <a:extLst>
+              <a:ext uri="{FF2B5EF4-FFF2-40B4-BE49-F238E27FC236}">
+                <a16:creationId xmlns:a16="http://schemas.microsoft.com/office/drawing/2014/main" id="{C121EDAC-2901-CC45-A0A7-8D75B4C1AB41}"/>
+              </a:ext>
+            </a:extLst>
+          </p:cNvPr>
+          <p:cNvSpPr txBox="1"/>
+          <p:nvPr/>
+        </p:nvSpPr>
+        <p:spPr>
+          <a:xfrm>
+            <a:off x="1456297" y="4296832"/>
+            <a:ext cx="838884" cy="369332"/>
+          </a:xfrm>
+          <a:prstGeom prst="rect">
+            <a:avLst/>
+          </a:prstGeom>
+          <a:noFill/>
+        </p:spPr>
+        <p:txBody>
+          <a:bodyPr wrap="none" rtlCol="0">
+            <a:spAutoFit/>
+          </a:bodyPr>
+          <a:lstStyle/>
+          <a:p>
+            <a:r>
+              <a:rPr lang="en-US" dirty="0"/>
+              <a:t> </a:t>
+            </a:r>
+            <a:r>
+              <a:rPr lang="en-US" dirty="0" err="1"/>
+              <a:t>lgreski</a:t>
+            </a:r>
+            <a:endParaRPr lang="en-US" dirty="0"/>
+          </a:p>
+        </p:txBody>
+      </p:sp>
+      <p:sp>
+        <p:nvSpPr>
+          <p:cNvPr id="9" name="TextBox 8">
+            <a:extLst>
+              <a:ext uri="{FF2B5EF4-FFF2-40B4-BE49-F238E27FC236}">
+                <a16:creationId xmlns:a16="http://schemas.microsoft.com/office/drawing/2014/main" id="{F66CC08F-50EB-9442-9382-9749498C8D6E}"/>
+              </a:ext>
+            </a:extLst>
+          </p:cNvPr>
+          <p:cNvSpPr txBox="1"/>
+          <p:nvPr/>
+        </p:nvSpPr>
+        <p:spPr>
+          <a:xfrm>
+            <a:off x="1456297" y="4609946"/>
+            <a:ext cx="8690969" cy="369332"/>
+          </a:xfrm>
+          <a:prstGeom prst="rect">
+            <a:avLst/>
+          </a:prstGeom>
+          <a:noFill/>
+        </p:spPr>
+        <p:txBody>
+          <a:bodyPr wrap="none" rtlCol="0">
+            <a:spAutoFit/>
+          </a:bodyPr>
+          <a:lstStyle/>
+          <a:p>
+            <a:r>
+              <a:rPr lang="en-US" dirty="0"/>
+              <a:t> </a:t>
+            </a:r>
+            <a:r>
+              <a:rPr lang="en-US" dirty="0" err="1"/>
+              <a:t>atl</a:t>
+            </a:r>
+            <a:r>
+              <a:rPr lang="en-US" dirty="0"/>
+              <a:t>-r-users/communications – repository where tonight’s code and presentation are stored </a:t>
+            </a:r>
+          </a:p>
+        </p:txBody>
+      </p:sp>
+      <p:pic>
+        <p:nvPicPr>
+          <p:cNvPr id="10" name="Picture 9">
+            <a:extLst>
+              <a:ext uri="{FF2B5EF4-FFF2-40B4-BE49-F238E27FC236}">
+                <a16:creationId xmlns:a16="http://schemas.microsoft.com/office/drawing/2014/main" id="{939D18BB-69F5-B443-91B0-AB1B112D102A}"/>
+              </a:ext>
+            </a:extLst>
+          </p:cNvPr>
+          <p:cNvPicPr>
+            <a:picLocks noChangeAspect="1"/>
+          </p:cNvPicPr>
+          <p:nvPr/>
+        </p:nvPicPr>
+        <p:blipFill>
+          <a:blip r:embed="rId7"/>
+          <a:stretch>
+            <a:fillRect/>
+          </a:stretch>
+        </p:blipFill>
+        <p:spPr>
+          <a:xfrm>
+            <a:off x="894957" y="5026221"/>
+            <a:ext cx="406400" cy="406400"/>
+          </a:xfrm>
+          <a:prstGeom prst="rect">
+            <a:avLst/>
+          </a:prstGeom>
+        </p:spPr>
+      </p:pic>
+      <p:sp>
+        <p:nvSpPr>
+          <p:cNvPr id="11" name="TextBox 10">
+            <a:extLst>
+              <a:ext uri="{FF2B5EF4-FFF2-40B4-BE49-F238E27FC236}">
+                <a16:creationId xmlns:a16="http://schemas.microsoft.com/office/drawing/2014/main" id="{821E509B-E0B5-984D-8495-D099B3C62B4E}"/>
+              </a:ext>
+            </a:extLst>
+          </p:cNvPr>
+          <p:cNvSpPr txBox="1"/>
+          <p:nvPr/>
+        </p:nvSpPr>
+        <p:spPr>
+          <a:xfrm>
+            <a:off x="1456297" y="5044755"/>
+            <a:ext cx="838884" cy="369332"/>
+          </a:xfrm>
+          <a:prstGeom prst="rect">
+            <a:avLst/>
+          </a:prstGeom>
+          <a:noFill/>
+        </p:spPr>
+        <p:txBody>
+          <a:bodyPr wrap="none" rtlCol="0">
+            <a:spAutoFit/>
+          </a:bodyPr>
+          <a:lstStyle/>
+          <a:p>
+            <a:r>
+              <a:rPr lang="en-US" dirty="0"/>
+              <a:t> </a:t>
+            </a:r>
+            <a:r>
+              <a:rPr lang="en-US" dirty="0" err="1"/>
+              <a:t>lgreski</a:t>
+            </a:r>
+            <a:endParaRPr lang="en-US" dirty="0"/>
+          </a:p>
+        </p:txBody>
+      </p:sp>
+      <p:pic>
+        <p:nvPicPr>
+          <p:cNvPr id="12" name="Picture 11">
+            <a:extLst>
+              <a:ext uri="{FF2B5EF4-FFF2-40B4-BE49-F238E27FC236}">
+                <a16:creationId xmlns:a16="http://schemas.microsoft.com/office/drawing/2014/main" id="{E258D6E7-31DF-B841-B3A5-67880E34E6C6}"/>
+              </a:ext>
+            </a:extLst>
+          </p:cNvPr>
+          <p:cNvPicPr>
+            <a:picLocks noChangeAspect="1"/>
+          </p:cNvPicPr>
+          <p:nvPr/>
+        </p:nvPicPr>
+        <p:blipFill>
+          <a:blip r:embed="rId8"/>
+          <a:stretch>
+            <a:fillRect/>
+          </a:stretch>
+        </p:blipFill>
+        <p:spPr>
+          <a:xfrm>
+            <a:off x="822013" y="5531999"/>
+            <a:ext cx="537047" cy="537047"/>
+          </a:xfrm>
+          <a:prstGeom prst="rect">
+            <a:avLst/>
+          </a:prstGeom>
+        </p:spPr>
+      </p:pic>
+      <p:sp>
+        <p:nvSpPr>
+          <p:cNvPr id="13" name="TextBox 12">
+            <a:extLst>
+              <a:ext uri="{FF2B5EF4-FFF2-40B4-BE49-F238E27FC236}">
+                <a16:creationId xmlns:a16="http://schemas.microsoft.com/office/drawing/2014/main" id="{C7BC55D7-BE16-0543-9D90-8400CC766953}"/>
+              </a:ext>
+            </a:extLst>
+          </p:cNvPr>
+          <p:cNvSpPr txBox="1"/>
+          <p:nvPr/>
+        </p:nvSpPr>
+        <p:spPr>
+          <a:xfrm>
+            <a:off x="1456297" y="5615856"/>
+            <a:ext cx="6703182" cy="369332"/>
+          </a:xfrm>
+          <a:prstGeom prst="rect">
+            <a:avLst/>
+          </a:prstGeom>
+          <a:noFill/>
+        </p:spPr>
+        <p:txBody>
+          <a:bodyPr wrap="none" rtlCol="0">
+            <a:spAutoFit/>
+          </a:bodyPr>
+          <a:lstStyle/>
+          <a:p>
+            <a:r>
+              <a:rPr lang="en-US" dirty="0"/>
+              <a:t> Data Science Depot blog: </a:t>
+            </a:r>
+            <a:r>
+              <a:rPr lang="en-US" dirty="0">
+                <a:hlinkClick r:id="rId9"/>
+              </a:rPr>
+              <a:t>https://lgreski.github.io/datasciencedepot/</a:t>
+            </a:r>
+            <a:r>
+              <a:rPr lang="en-US" dirty="0"/>
+              <a:t> </a:t>
+            </a:r>
+          </a:p>
+        </p:txBody>
+      </p:sp>
+      <p:sp>
+        <p:nvSpPr>
+          <p:cNvPr id="14" name="TextBox 13">
+            <a:extLst>
+              <a:ext uri="{FF2B5EF4-FFF2-40B4-BE49-F238E27FC236}">
+                <a16:creationId xmlns:a16="http://schemas.microsoft.com/office/drawing/2014/main" id="{A9F10A48-1AA5-F144-818F-BACDFEE8248C}"/>
+              </a:ext>
+            </a:extLst>
+          </p:cNvPr>
+          <p:cNvSpPr txBox="1"/>
+          <p:nvPr/>
+        </p:nvSpPr>
+        <p:spPr>
+          <a:xfrm>
+            <a:off x="2865120" y="1384844"/>
+            <a:ext cx="8883009" cy="2308324"/>
+          </a:xfrm>
+          <a:prstGeom prst="rect">
+            <a:avLst/>
+          </a:prstGeom>
+          <a:noFill/>
+        </p:spPr>
+        <p:txBody>
+          <a:bodyPr wrap="none" rtlCol="0">
+            <a:spAutoFit/>
+          </a:bodyPr>
+          <a:lstStyle/>
+          <a:p>
+            <a:r>
+              <a:rPr lang="en-US" dirty="0"/>
+              <a:t>Len Greski currently serves as Principal Consultant at LeadingAgile, the leader in helping large</a:t>
+            </a:r>
+            <a:br>
+              <a:rPr lang="en-US" dirty="0"/>
+            </a:br>
+            <a:r>
+              <a:rPr lang="en-US" dirty="0"/>
+              <a:t>companies generate economic value through agile transformation. Len started his </a:t>
+            </a:r>
+            <a:br>
+              <a:rPr lang="en-US" dirty="0"/>
+            </a:br>
+            <a:r>
+              <a:rPr lang="en-US" dirty="0"/>
+              <a:t>career at Information Resources Inc., developing statistical and AI models to predict</a:t>
+            </a:r>
+            <a:br>
+              <a:rPr lang="en-US" dirty="0"/>
+            </a:br>
+            <a:r>
+              <a:rPr lang="en-US" dirty="0"/>
+              <a:t>consumer behavior. He learned R in 2015 when he needed a way to analyze the value of a </a:t>
+            </a:r>
+            <a:br>
+              <a:rPr lang="en-US" dirty="0"/>
+            </a:br>
+            <a:r>
+              <a:rPr lang="en-US" dirty="0"/>
+              <a:t>software portfolio without spending $9,000 on a copy of SAS.  Len has mentored hundreds </a:t>
+            </a:r>
+          </a:p>
+          <a:p>
+            <a:r>
+              <a:rPr lang="en-US" dirty="0"/>
+              <a:t>of thousands of students in the Johns Hopkins University Data Science Specialization on </a:t>
+            </a:r>
+          </a:p>
+          <a:p>
+            <a:r>
+              <a:rPr lang="en-US" dirty="0"/>
+              <a:t>Coursera, having served as a Community Mentor since 2015.  Len has a top 5% </a:t>
+            </a:r>
+            <a:br>
+              <a:rPr lang="en-US" dirty="0"/>
+            </a:br>
+            <a:r>
+              <a:rPr lang="en-US" dirty="0"/>
+              <a:t>ranking on </a:t>
+            </a:r>
+            <a:r>
+              <a:rPr lang="en-US" dirty="0" err="1"/>
+              <a:t>Stackoverflow.com</a:t>
+            </a:r>
+            <a:r>
+              <a:rPr lang="en-US" dirty="0"/>
+              <a:t>, where he primarily answers questions about R. </a:t>
+            </a:r>
+          </a:p>
+        </p:txBody>
+      </p:sp>
+      <p:pic>
+        <p:nvPicPr>
+          <p:cNvPr id="3" name="Picture 2">
+            <a:extLst>
+              <a:ext uri="{FF2B5EF4-FFF2-40B4-BE49-F238E27FC236}">
+                <a16:creationId xmlns:a16="http://schemas.microsoft.com/office/drawing/2014/main" id="{846F0604-A56E-6D4D-A7EF-83B564E656A9}"/>
+              </a:ext>
+            </a:extLst>
+          </p:cNvPr>
+          <p:cNvPicPr>
+            <a:picLocks noChangeAspect="1"/>
+          </p:cNvPicPr>
+          <p:nvPr/>
+        </p:nvPicPr>
+        <p:blipFill>
+          <a:blip r:embed="rId10"/>
+          <a:stretch>
+            <a:fillRect/>
+          </a:stretch>
+        </p:blipFill>
+        <p:spPr>
+          <a:xfrm>
+            <a:off x="822013" y="6156476"/>
+            <a:ext cx="1925958" cy="537046"/>
+          </a:xfrm>
+          <a:prstGeom prst="rect">
+            <a:avLst/>
+          </a:prstGeom>
+        </p:spPr>
+      </p:pic>
+    </p:spTree>
+    <p:extLst>
+      <p:ext uri="{BB962C8B-B14F-4D97-AF65-F5344CB8AC3E}">
+        <p14:creationId xmlns:p14="http://schemas.microsoft.com/office/powerpoint/2010/main" val="3418446521"/>
       </p:ext>
     </p:extLst>
   </p:cSld>
@@ -5699,7 +7365,7 @@
           <a:p>
             <a:r>
               <a:rPr lang="en-US" dirty="0"/>
-              <a:t>Original solution: works, but wrong results</a:t>
+              <a:t>Original solution: runs, but inaccurate results</a:t>
             </a:r>
           </a:p>
         </p:txBody>
@@ -6086,12 +7752,86 @@
           </a:p>
         </p:txBody>
       </p:sp>
+      <p:sp>
+        <p:nvSpPr>
+          <p:cNvPr id="4" name="TextBox 3">
+            <a:extLst>
+              <a:ext uri="{FF2B5EF4-FFF2-40B4-BE49-F238E27FC236}">
+                <a16:creationId xmlns:a16="http://schemas.microsoft.com/office/drawing/2014/main" id="{83032949-76B0-024B-A88E-7EB81F157E5A}"/>
+              </a:ext>
+            </a:extLst>
+          </p:cNvPr>
+          <p:cNvSpPr txBox="1"/>
+          <p:nvPr/>
+        </p:nvSpPr>
+        <p:spPr>
+          <a:xfrm>
+            <a:off x="7231774" y="2720072"/>
+            <a:ext cx="4122026" cy="1938992"/>
+          </a:xfrm>
+          <a:prstGeom prst="rect">
+            <a:avLst/>
+          </a:prstGeom>
+          <a:noFill/>
+        </p:spPr>
+        <p:txBody>
+          <a:bodyPr wrap="none" rtlCol="0">
+            <a:spAutoFit/>
+          </a:bodyPr>
+          <a:lstStyle/>
+          <a:p>
+            <a:pPr marL="457200" indent="-457200">
+              <a:buFont typeface="Arial" panose="020B0604020202020204" pitchFamily="34" charset="0"/>
+              <a:buChar char="•"/>
+            </a:pPr>
+            <a:r>
+              <a:rPr lang="en-US" sz="2000" dirty="0"/>
+              <a:t>A distribution that looks binomial</a:t>
+            </a:r>
+            <a:br>
+              <a:rPr lang="en-US" sz="2000" dirty="0"/>
+            </a:br>
+            <a:endParaRPr lang="en-US" sz="2000" dirty="0"/>
+          </a:p>
+          <a:p>
+            <a:pPr marL="457200" indent="-457200">
+              <a:buFont typeface="Arial" panose="020B0604020202020204" pitchFamily="34" charset="0"/>
+              <a:buChar char="•"/>
+            </a:pPr>
+            <a:r>
+              <a:rPr lang="en-US" sz="2000" dirty="0"/>
+              <a:t>A coverage percentage close to</a:t>
+            </a:r>
+            <a:br>
+              <a:rPr lang="en-US" sz="2000" dirty="0"/>
+            </a:br>
+            <a:r>
+              <a:rPr lang="en-US" sz="2000" dirty="0"/>
+              <a:t>1 – alpha (rejection region) in</a:t>
+            </a:r>
+            <a:br>
+              <a:rPr lang="en-US" sz="2000" dirty="0"/>
+            </a:br>
+            <a:r>
+              <a:rPr lang="en-US" sz="2000" dirty="0"/>
+              <a:t>confidence interval </a:t>
+            </a:r>
+          </a:p>
+          <a:p>
+            <a:pPr marL="457200" indent="-457200">
+              <a:buFont typeface="Arial" panose="020B0604020202020204" pitchFamily="34" charset="0"/>
+              <a:buChar char="•"/>
+            </a:pPr>
+            <a:endParaRPr lang="en-US" sz="2000" dirty="0"/>
+          </a:p>
+        </p:txBody>
+      </p:sp>
       <p:pic>
         <p:nvPicPr>
-          <p:cNvPr id="3" name="Picture 2">
-            <a:extLst>
-              <a:ext uri="{FF2B5EF4-FFF2-40B4-BE49-F238E27FC236}">
-                <a16:creationId xmlns:a16="http://schemas.microsoft.com/office/drawing/2014/main" id="{79DD9F74-4D43-3946-A7C5-EFCBF432B057}"/>
+          <p:cNvPr id="6" name="Picture 5">
+            <a:extLst>
+              <a:ext uri="{FF2B5EF4-FFF2-40B4-BE49-F238E27FC236}">
+                <a16:creationId xmlns:a16="http://schemas.microsoft.com/office/drawing/2014/main" id="{E9995C30-5E5D-D847-B1A2-9001F5706405}"/>
               </a:ext>
             </a:extLst>
           </p:cNvPr>
@@ -6108,94 +7848,20 @@
         </p:blipFill>
         <p:spPr>
           <a:xfrm>
-            <a:off x="1018540" y="1573530"/>
-            <a:ext cx="5918200" cy="3924300"/>
+            <a:off x="1228090" y="1254507"/>
+            <a:ext cx="5218430" cy="3816121"/>
           </a:xfrm>
           <a:prstGeom prst="rect">
             <a:avLst/>
           </a:prstGeom>
         </p:spPr>
       </p:pic>
-      <p:sp>
-        <p:nvSpPr>
-          <p:cNvPr id="4" name="TextBox 3">
-            <a:extLst>
-              <a:ext uri="{FF2B5EF4-FFF2-40B4-BE49-F238E27FC236}">
-                <a16:creationId xmlns:a16="http://schemas.microsoft.com/office/drawing/2014/main" id="{83032949-76B0-024B-A88E-7EB81F157E5A}"/>
-              </a:ext>
-            </a:extLst>
-          </p:cNvPr>
-          <p:cNvSpPr txBox="1"/>
-          <p:nvPr/>
-        </p:nvSpPr>
-        <p:spPr>
-          <a:xfrm>
-            <a:off x="7231774" y="2720072"/>
-            <a:ext cx="4122026" cy="1938992"/>
-          </a:xfrm>
-          <a:prstGeom prst="rect">
-            <a:avLst/>
-          </a:prstGeom>
-          <a:noFill/>
-        </p:spPr>
-        <p:txBody>
-          <a:bodyPr wrap="none" rtlCol="0">
-            <a:spAutoFit/>
-          </a:bodyPr>
-          <a:lstStyle/>
-          <a:p>
-            <a:pPr marL="457200" indent="-457200">
-              <a:buFont typeface="Arial" panose="020B0604020202020204" pitchFamily="34" charset="0"/>
-              <a:buChar char="•"/>
-            </a:pPr>
-            <a:r>
-              <a:rPr lang="en-US" sz="2000" dirty="0"/>
-              <a:t>A distribution that looks binomial</a:t>
-            </a:r>
-            <a:br>
-              <a:rPr lang="en-US" sz="2000" dirty="0"/>
-            </a:br>
-            <a:endParaRPr lang="en-US" sz="2000" dirty="0"/>
-          </a:p>
-          <a:p>
-            <a:pPr marL="457200" indent="-457200">
-              <a:buFont typeface="Arial" panose="020B0604020202020204" pitchFamily="34" charset="0"/>
-              <a:buChar char="•"/>
-            </a:pPr>
-            <a:r>
-              <a:rPr lang="en-US" sz="2000" dirty="0"/>
-              <a:t>A coverage percentage close to</a:t>
-            </a:r>
-            <a:br>
-              <a:rPr lang="en-US" sz="2000" dirty="0"/>
-            </a:br>
-            <a:r>
-              <a:rPr lang="en-US" sz="2000" dirty="0"/>
-              <a:t>1 – alpha (rejection region) in</a:t>
-            </a:r>
-            <a:br>
-              <a:rPr lang="en-US" sz="2000" dirty="0"/>
-            </a:br>
-            <a:r>
-              <a:rPr lang="en-US" sz="2000" dirty="0"/>
-              <a:t>confidence interval </a:t>
-            </a:r>
-          </a:p>
-          <a:p>
-            <a:pPr marL="457200" indent="-457200">
-              <a:buFont typeface="Arial" panose="020B0604020202020204" pitchFamily="34" charset="0"/>
-              <a:buChar char="•"/>
-            </a:pPr>
-            <a:endParaRPr lang="en-US" sz="2000" dirty="0"/>
-          </a:p>
-        </p:txBody>
-      </p:sp>
       <p:pic>
         <p:nvPicPr>
-          <p:cNvPr id="5" name="Picture 4">
-            <a:extLst>
-              <a:ext uri="{FF2B5EF4-FFF2-40B4-BE49-F238E27FC236}">
-                <a16:creationId xmlns:a16="http://schemas.microsoft.com/office/drawing/2014/main" id="{8FE809EA-1F82-684C-ABD4-11FA49B8A5F0}"/>
+          <p:cNvPr id="7" name="Picture 6">
+            <a:extLst>
+              <a:ext uri="{FF2B5EF4-FFF2-40B4-BE49-F238E27FC236}">
+                <a16:creationId xmlns:a16="http://schemas.microsoft.com/office/drawing/2014/main" id="{AFB957AF-50E9-D047-BFCC-BE7C2E671553}"/>
               </a:ext>
             </a:extLst>
           </p:cNvPr>
@@ -6212,8 +7878,8 @@
         </p:blipFill>
         <p:spPr>
           <a:xfrm>
-            <a:off x="1075690" y="5554980"/>
-            <a:ext cx="6870700" cy="1104900"/>
+            <a:off x="702309" y="5081739"/>
+            <a:ext cx="6506616" cy="1471461"/>
           </a:xfrm>
           <a:prstGeom prst="rect">
             <a:avLst/>
@@ -6323,7 +7989,7 @@
         <p:spPr>
           <a:xfrm>
             <a:off x="9106294" y="2151727"/>
-            <a:ext cx="2887586" cy="2554545"/>
+            <a:ext cx="2887586" cy="3477875"/>
           </a:xfrm>
           <a:prstGeom prst="rect">
             <a:avLst/>
@@ -6363,6 +8029,23 @@
             <a:r>
               <a:rPr lang="en-US" sz="2000" dirty="0"/>
               <a:t>facilitates understanding</a:t>
+            </a:r>
+            <a:br>
+              <a:rPr lang="en-US" sz="2000" dirty="0"/>
+            </a:br>
+            <a:br>
+              <a:rPr lang="en-US" sz="2000" dirty="0"/>
+            </a:br>
+            <a:r>
+              <a:rPr lang="en-US" sz="2000" dirty="0"/>
+              <a:t>We’ll refactor for speed</a:t>
+            </a:r>
+            <a:br>
+              <a:rPr lang="en-US" sz="2000" dirty="0"/>
+            </a:br>
+            <a:r>
+              <a:rPr lang="en-US" sz="2000" dirty="0"/>
+              <a:t>in a subsequent step</a:t>
             </a:r>
             <a:br>
               <a:rPr lang="en-US" sz="2000" dirty="0"/>
@@ -6459,6 +8142,77 @@
           </a:prstGeom>
         </p:spPr>
       </p:pic>
+      <p:sp>
+        <p:nvSpPr>
+          <p:cNvPr id="6" name="TextBox 5">
+            <a:extLst>
+              <a:ext uri="{FF2B5EF4-FFF2-40B4-BE49-F238E27FC236}">
+                <a16:creationId xmlns:a16="http://schemas.microsoft.com/office/drawing/2014/main" id="{9B3F97F7-C3AF-4B4E-ACB0-60DC9A6527BC}"/>
+              </a:ext>
+            </a:extLst>
+          </p:cNvPr>
+          <p:cNvSpPr txBox="1"/>
+          <p:nvPr/>
+        </p:nvSpPr>
+        <p:spPr>
+          <a:xfrm>
+            <a:off x="7103469" y="2459504"/>
+            <a:ext cx="4250331" cy="1938992"/>
+          </a:xfrm>
+          <a:prstGeom prst="rect">
+            <a:avLst/>
+          </a:prstGeom>
+          <a:noFill/>
+        </p:spPr>
+        <p:txBody>
+          <a:bodyPr wrap="none" rtlCol="0">
+            <a:spAutoFit/>
+          </a:bodyPr>
+          <a:lstStyle/>
+          <a:p>
+            <a:pPr marL="457200" indent="-457200">
+              <a:buFont typeface="Arial" panose="020B0604020202020204" pitchFamily="34" charset="0"/>
+              <a:buChar char="•"/>
+            </a:pPr>
+            <a:r>
+              <a:rPr lang="en-US" sz="2000" dirty="0"/>
+              <a:t>Observed p is a proportion with </a:t>
+            </a:r>
+            <a:br>
+              <a:rPr lang="en-US" sz="2000" dirty="0"/>
+            </a:br>
+            <a:r>
+              <a:rPr lang="en-US" sz="2000" dirty="0"/>
+              <a:t>values 0, 0.2, 0.4, 0.6, 0.8, 1.0</a:t>
+            </a:r>
+            <a:br>
+              <a:rPr lang="en-US" sz="2000" dirty="0"/>
+            </a:br>
+            <a:endParaRPr lang="en-US" sz="2000" dirty="0"/>
+          </a:p>
+          <a:p>
+            <a:pPr marL="457200" indent="-457200">
+              <a:buFont typeface="Arial" panose="020B0604020202020204" pitchFamily="34" charset="0"/>
+              <a:buChar char="•"/>
+            </a:pPr>
+            <a:r>
+              <a:rPr lang="en-US" sz="2000" dirty="0"/>
+              <a:t>Confidence intervals vary by value </a:t>
+            </a:r>
+            <a:br>
+              <a:rPr lang="en-US" sz="2000" dirty="0"/>
+            </a:br>
+            <a:r>
+              <a:rPr lang="en-US" sz="2000" dirty="0"/>
+              <a:t>of observed p</a:t>
+            </a:r>
+            <a:br>
+              <a:rPr lang="en-US" sz="2000" dirty="0"/>
+            </a:br>
+            <a:endParaRPr lang="en-US" sz="2000" dirty="0"/>
+          </a:p>
+        </p:txBody>
+      </p:sp>
     </p:spTree>
     <p:extLst>
       <p:ext uri="{BB962C8B-B14F-4D97-AF65-F5344CB8AC3E}">
@@ -6591,8 +8345,8 @@
         </p:nvSpPr>
         <p:spPr>
           <a:xfrm>
-            <a:off x="6820294" y="2286000"/>
-            <a:ext cx="4592796" cy="2862322"/>
+            <a:off x="6819664" y="1645920"/>
+            <a:ext cx="4592796" cy="4093428"/>
           </a:xfrm>
           <a:prstGeom prst="rect">
             <a:avLst/>
@@ -6604,6 +8358,38 @@
             <a:spAutoFit/>
           </a:bodyPr>
           <a:lstStyle/>
+          <a:p>
+            <a:pPr marL="457200" indent="-457200">
+              <a:buFont typeface="Arial" panose="020B0604020202020204" pitchFamily="34" charset="0"/>
+              <a:buChar char="•"/>
+            </a:pPr>
+            <a:r>
+              <a:rPr lang="en-US" sz="2000" dirty="0"/>
+              <a:t>We deconstruct the nested </a:t>
+            </a:r>
+            <a:r>
+              <a:rPr lang="en-US" sz="2000" b="1" dirty="0"/>
+              <a:t>apply()</a:t>
+            </a:r>
+            <a:br>
+              <a:rPr lang="en-US" sz="2000" dirty="0"/>
+            </a:br>
+            <a:r>
+              <a:rPr lang="en-US" sz="2000" dirty="0"/>
+              <a:t>functions for a single set of input </a:t>
+            </a:r>
+            <a:br>
+              <a:rPr lang="en-US" sz="2000" dirty="0"/>
+            </a:br>
+            <a:r>
+              <a:rPr lang="en-US" sz="2000" dirty="0"/>
+              <a:t>values and step through the code  </a:t>
+            </a:r>
+            <a:br>
+              <a:rPr lang="en-US" sz="2000" dirty="0"/>
+            </a:br>
+            <a:endParaRPr lang="en-US" sz="2000" dirty="0"/>
+          </a:p>
           <a:p>
             <a:pPr marL="457200" indent="-457200">
               <a:buFont typeface="Arial" panose="020B0604020202020204" pitchFamily="34" charset="0"/>

</xml_diff>

<commit_message>
add horizontal reference lines on coverage plots
</commit_message>
<xml_diff>
--- a/presentations/debuggingBernoulliTrials.pptx
+++ b/presentations/debuggingBernoulliTrials.pptx
@@ -5,7 +5,7 @@
     <p:sldMasterId id="2147483648" r:id="rId1"/>
   </p:sldMasterIdLst>
   <p:notesMasterIdLst>
-    <p:notesMasterId r:id="rId22"/>
+    <p:notesMasterId r:id="rId23"/>
   </p:notesMasterIdLst>
   <p:sldIdLst>
     <p:sldId id="256" r:id="rId2"/>
@@ -23,11 +23,12 @@
     <p:sldId id="291" r:id="rId14"/>
     <p:sldId id="292" r:id="rId15"/>
     <p:sldId id="295" r:id="rId16"/>
-    <p:sldId id="293" r:id="rId17"/>
-    <p:sldId id="294" r:id="rId18"/>
-    <p:sldId id="276" r:id="rId19"/>
-    <p:sldId id="290" r:id="rId20"/>
-    <p:sldId id="278" r:id="rId21"/>
+    <p:sldId id="296" r:id="rId17"/>
+    <p:sldId id="293" r:id="rId18"/>
+    <p:sldId id="294" r:id="rId19"/>
+    <p:sldId id="276" r:id="rId20"/>
+    <p:sldId id="290" r:id="rId21"/>
+    <p:sldId id="278" r:id="rId22"/>
   </p:sldIdLst>
   <p:sldSz cx="12192000" cy="6858000"/>
   <p:notesSz cx="6858000" cy="9144000"/>
@@ -216,7 +217,7 @@
           <a:p>
             <a:fld id="{18A5D979-93FC-144A-AB28-6BA00BC12244}" type="datetimeFigureOut">
               <a:rPr lang="en-US" smtClean="0"/>
-              <a:t>3/24/21</a:t>
+              <a:t>3/25/21</a:t>
             </a:fld>
             <a:endParaRPr lang="en-US"/>
           </a:p>
@@ -727,7 +728,7 @@
           <a:p>
             <a:fld id="{ABA03B9F-5CD9-F644-B9E1-D29863D066F7}" type="slidenum">
               <a:rPr lang="en-US" smtClean="0"/>
-              <a:t>17</a:t>
+              <a:t>18</a:t>
             </a:fld>
             <a:endParaRPr lang="en-US"/>
           </a:p>
@@ -811,7 +812,7 @@
           <a:p>
             <a:fld id="{ABA03B9F-5CD9-F644-B9E1-D29863D066F7}" type="slidenum">
               <a:rPr lang="en-US" smtClean="0"/>
-              <a:t>20</a:t>
+              <a:t>21</a:t>
             </a:fld>
             <a:endParaRPr lang="en-US"/>
           </a:p>
@@ -977,7 +978,7 @@
           <a:p>
             <a:fld id="{211EC6DF-777A-4142-B847-255B1624343C}" type="datetimeFigureOut">
               <a:rPr lang="en-US" smtClean="0"/>
-              <a:t>3/24/21</a:t>
+              <a:t>3/25/21</a:t>
             </a:fld>
             <a:endParaRPr lang="en-US"/>
           </a:p>
@@ -1175,7 +1176,7 @@
           <a:p>
             <a:fld id="{211EC6DF-777A-4142-B847-255B1624343C}" type="datetimeFigureOut">
               <a:rPr lang="en-US" smtClean="0"/>
-              <a:t>3/24/21</a:t>
+              <a:t>3/25/21</a:t>
             </a:fld>
             <a:endParaRPr lang="en-US"/>
           </a:p>
@@ -1383,7 +1384,7 @@
           <a:p>
             <a:fld id="{211EC6DF-777A-4142-B847-255B1624343C}" type="datetimeFigureOut">
               <a:rPr lang="en-US" smtClean="0"/>
-              <a:t>3/24/21</a:t>
+              <a:t>3/25/21</a:t>
             </a:fld>
             <a:endParaRPr lang="en-US"/>
           </a:p>
@@ -1581,7 +1582,7 @@
           <a:p>
             <a:fld id="{211EC6DF-777A-4142-B847-255B1624343C}" type="datetimeFigureOut">
               <a:rPr lang="en-US" smtClean="0"/>
-              <a:t>3/24/21</a:t>
+              <a:t>3/25/21</a:t>
             </a:fld>
             <a:endParaRPr lang="en-US"/>
           </a:p>
@@ -1856,7 +1857,7 @@
           <a:p>
             <a:fld id="{211EC6DF-777A-4142-B847-255B1624343C}" type="datetimeFigureOut">
               <a:rPr lang="en-US" smtClean="0"/>
-              <a:t>3/24/21</a:t>
+              <a:t>3/25/21</a:t>
             </a:fld>
             <a:endParaRPr lang="en-US"/>
           </a:p>
@@ -2121,7 +2122,7 @@
           <a:p>
             <a:fld id="{211EC6DF-777A-4142-B847-255B1624343C}" type="datetimeFigureOut">
               <a:rPr lang="en-US" smtClean="0"/>
-              <a:t>3/24/21</a:t>
+              <a:t>3/25/21</a:t>
             </a:fld>
             <a:endParaRPr lang="en-US"/>
           </a:p>
@@ -2533,7 +2534,7 @@
           <a:p>
             <a:fld id="{211EC6DF-777A-4142-B847-255B1624343C}" type="datetimeFigureOut">
               <a:rPr lang="en-US" smtClean="0"/>
-              <a:t>3/24/21</a:t>
+              <a:t>3/25/21</a:t>
             </a:fld>
             <a:endParaRPr lang="en-US"/>
           </a:p>
@@ -2685,7 +2686,7 @@
           <a:p>
             <a:fld id="{211EC6DF-777A-4142-B847-255B1624343C}" type="datetimeFigureOut">
               <a:rPr lang="en-US" smtClean="0"/>
-              <a:t>3/24/21</a:t>
+              <a:t>3/25/21</a:t>
             </a:fld>
             <a:endParaRPr lang="en-US"/>
           </a:p>
@@ -2798,7 +2799,7 @@
           <a:p>
             <a:fld id="{211EC6DF-777A-4142-B847-255B1624343C}" type="datetimeFigureOut">
               <a:rPr lang="en-US" smtClean="0"/>
-              <a:t>3/24/21</a:t>
+              <a:t>3/25/21</a:t>
             </a:fld>
             <a:endParaRPr lang="en-US"/>
           </a:p>
@@ -3109,7 +3110,7 @@
           <a:p>
             <a:fld id="{211EC6DF-777A-4142-B847-255B1624343C}" type="datetimeFigureOut">
               <a:rPr lang="en-US" smtClean="0"/>
-              <a:t>3/24/21</a:t>
+              <a:t>3/25/21</a:t>
             </a:fld>
             <a:endParaRPr lang="en-US"/>
           </a:p>
@@ -3397,7 +3398,7 @@
           <a:p>
             <a:fld id="{211EC6DF-777A-4142-B847-255B1624343C}" type="datetimeFigureOut">
               <a:rPr lang="en-US" smtClean="0"/>
-              <a:t>3/24/21</a:t>
+              <a:t>3/25/21</a:t>
             </a:fld>
             <a:endParaRPr lang="en-US"/>
           </a:p>
@@ -3638,7 +3639,7 @@
           <a:p>
             <a:fld id="{211EC6DF-777A-4142-B847-255B1624343C}" type="datetimeFigureOut">
               <a:rPr lang="en-US" smtClean="0"/>
-              <a:t>3/24/21</a:t>
+              <a:t>3/25/21</a:t>
             </a:fld>
             <a:endParaRPr lang="en-US"/>
           </a:p>
@@ -5169,40 +5170,12 @@
           <a:chExt cx="0" cy="0"/>
         </a:xfrm>
       </p:grpSpPr>
-      <p:sp>
-        <p:nvSpPr>
-          <p:cNvPr id="2" name="Title 1">
-            <a:extLst>
-              <a:ext uri="{FF2B5EF4-FFF2-40B4-BE49-F238E27FC236}">
-                <a16:creationId xmlns:a16="http://schemas.microsoft.com/office/drawing/2014/main" id="{0530D142-84DD-3D46-ACF8-A3D2C3A43892}"/>
-              </a:ext>
-            </a:extLst>
-          </p:cNvPr>
-          <p:cNvSpPr>
-            <a:spLocks noGrp="1"/>
-          </p:cNvSpPr>
-          <p:nvPr>
-            <p:ph type="title"/>
-          </p:nvPr>
-        </p:nvSpPr>
-        <p:spPr/>
-        <p:txBody>
-          <a:bodyPr/>
-          <a:lstStyle/>
-          <a:p>
-            <a:r>
-              <a:rPr lang="en-US" dirty="0"/>
-              <a:t>A more sophisticated solution</a:t>
-            </a:r>
-          </a:p>
-        </p:txBody>
-      </p:sp>
       <p:pic>
         <p:nvPicPr>
-          <p:cNvPr id="3" name="Picture 2">
-            <a:extLst>
-              <a:ext uri="{FF2B5EF4-FFF2-40B4-BE49-F238E27FC236}">
-                <a16:creationId xmlns:a16="http://schemas.microsoft.com/office/drawing/2014/main" id="{0FD5D85E-754E-9848-9043-F6959E692E26}"/>
+          <p:cNvPr id="9" name="Picture 8">
+            <a:extLst>
+              <a:ext uri="{FF2B5EF4-FFF2-40B4-BE49-F238E27FC236}">
+                <a16:creationId xmlns:a16="http://schemas.microsoft.com/office/drawing/2014/main" id="{02DD2E9B-F8B2-754A-800E-6547B2471EA3}"/>
               </a:ext>
             </a:extLst>
           </p:cNvPr>
@@ -5219,14 +5192,42 @@
         </p:blipFill>
         <p:spPr>
           <a:xfrm>
-            <a:off x="838200" y="1450340"/>
-            <a:ext cx="9448800" cy="3073400"/>
+            <a:off x="889000" y="1487552"/>
+            <a:ext cx="9349946" cy="3023488"/>
           </a:xfrm>
           <a:prstGeom prst="rect">
             <a:avLst/>
           </a:prstGeom>
         </p:spPr>
       </p:pic>
+      <p:sp>
+        <p:nvSpPr>
+          <p:cNvPr id="2" name="Title 1">
+            <a:extLst>
+              <a:ext uri="{FF2B5EF4-FFF2-40B4-BE49-F238E27FC236}">
+                <a16:creationId xmlns:a16="http://schemas.microsoft.com/office/drawing/2014/main" id="{0530D142-84DD-3D46-ACF8-A3D2C3A43892}"/>
+              </a:ext>
+            </a:extLst>
+          </p:cNvPr>
+          <p:cNvSpPr>
+            <a:spLocks noGrp="1"/>
+          </p:cNvSpPr>
+          <p:nvPr>
+            <p:ph type="title"/>
+          </p:nvPr>
+        </p:nvSpPr>
+        <p:spPr/>
+        <p:txBody>
+          <a:bodyPr/>
+          <a:lstStyle/>
+          <a:p>
+            <a:r>
+              <a:rPr lang="en-US" dirty="0"/>
+              <a:t>A more sophisticated solution</a:t>
+            </a:r>
+          </a:p>
+        </p:txBody>
+      </p:sp>
       <p:pic>
         <p:nvPicPr>
           <p:cNvPr id="4" name="Picture 3">
@@ -5400,6 +5401,92 @@
             <a:r>
               <a:rPr lang="en-US" dirty="0"/>
               <a:t> and Lewis, 2005</a:t>
+            </a:r>
+          </a:p>
+        </p:txBody>
+      </p:sp>
+      <p:cxnSp>
+        <p:nvCxnSpPr>
+          <p:cNvPr id="10" name="Straight Arrow Connector 9">
+            <a:extLst>
+              <a:ext uri="{FF2B5EF4-FFF2-40B4-BE49-F238E27FC236}">
+                <a16:creationId xmlns:a16="http://schemas.microsoft.com/office/drawing/2014/main" id="{51CB5375-D3DC-E74B-9E7B-3370D1B333A0}"/>
+              </a:ext>
+            </a:extLst>
+          </p:cNvPr>
+          <p:cNvCxnSpPr>
+            <a:cxnSpLocks/>
+          </p:cNvCxnSpPr>
+          <p:nvPr/>
+        </p:nvCxnSpPr>
+        <p:spPr>
+          <a:xfrm flipH="1" flipV="1">
+            <a:off x="7101840" y="4322698"/>
+            <a:ext cx="1508760" cy="601980"/>
+          </a:xfrm>
+          <a:prstGeom prst="straightConnector1">
+            <a:avLst/>
+          </a:prstGeom>
+          <a:ln>
+            <a:solidFill>
+              <a:srgbClr val="C00000"/>
+            </a:solidFill>
+            <a:tailEnd type="triangle"/>
+          </a:ln>
+        </p:spPr>
+        <p:style>
+          <a:lnRef idx="1">
+            <a:schemeClr val="accent1"/>
+          </a:lnRef>
+          <a:fillRef idx="0">
+            <a:schemeClr val="accent1"/>
+          </a:fillRef>
+          <a:effectRef idx="0">
+            <a:schemeClr val="accent1"/>
+          </a:effectRef>
+          <a:fontRef idx="minor">
+            <a:schemeClr val="tx1"/>
+          </a:fontRef>
+        </p:style>
+      </p:cxnSp>
+      <p:sp>
+        <p:nvSpPr>
+          <p:cNvPr id="12" name="TextBox 11">
+            <a:extLst>
+              <a:ext uri="{FF2B5EF4-FFF2-40B4-BE49-F238E27FC236}">
+                <a16:creationId xmlns:a16="http://schemas.microsoft.com/office/drawing/2014/main" id="{D8C7497A-AFBF-C94B-91CC-5F0499899823}"/>
+              </a:ext>
+            </a:extLst>
+          </p:cNvPr>
+          <p:cNvSpPr txBox="1"/>
+          <p:nvPr/>
+        </p:nvSpPr>
+        <p:spPr>
+          <a:xfrm>
+            <a:off x="8610600" y="4608904"/>
+            <a:ext cx="2165273" cy="523220"/>
+          </a:xfrm>
+          <a:prstGeom prst="rect">
+            <a:avLst/>
+          </a:prstGeom>
+          <a:noFill/>
+        </p:spPr>
+        <p:txBody>
+          <a:bodyPr wrap="none" rtlCol="0">
+            <a:spAutoFit/>
+          </a:bodyPr>
+          <a:lstStyle/>
+          <a:p>
+            <a:r>
+              <a:rPr lang="en-US" sz="1400" dirty="0"/>
+              <a:t>Let R calculate value of Z at</a:t>
+            </a:r>
+            <a:br>
+              <a:rPr lang="en-US" sz="1400" dirty="0"/>
+            </a:br>
+            <a:r>
+              <a:rPr lang="en-US" sz="1400" dirty="0"/>
+              <a:t>95% confidence interval</a:t>
             </a:r>
           </a:p>
         </p:txBody>
@@ -5434,40 +5521,12 @@
           <a:chExt cx="0" cy="0"/>
         </a:xfrm>
       </p:grpSpPr>
-      <p:sp>
-        <p:nvSpPr>
-          <p:cNvPr id="2" name="Title 1">
-            <a:extLst>
-              <a:ext uri="{FF2B5EF4-FFF2-40B4-BE49-F238E27FC236}">
-                <a16:creationId xmlns:a16="http://schemas.microsoft.com/office/drawing/2014/main" id="{3D9B8D10-3646-064E-B219-91168F927F19}"/>
-              </a:ext>
-            </a:extLst>
-          </p:cNvPr>
-          <p:cNvSpPr>
-            <a:spLocks noGrp="1"/>
-          </p:cNvSpPr>
-          <p:nvPr>
-            <p:ph type="title"/>
-          </p:nvPr>
-        </p:nvSpPr>
-        <p:spPr/>
-        <p:txBody>
-          <a:bodyPr/>
-          <a:lstStyle/>
-          <a:p>
-            <a:r>
-              <a:rPr lang="en-US" dirty="0"/>
-              <a:t>Run 132 Monte Carlo Simulations</a:t>
-            </a:r>
-          </a:p>
-        </p:txBody>
-      </p:sp>
       <p:pic>
         <p:nvPicPr>
           <p:cNvPr id="4" name="Picture 3">
             <a:extLst>
               <a:ext uri="{FF2B5EF4-FFF2-40B4-BE49-F238E27FC236}">
-                <a16:creationId xmlns:a16="http://schemas.microsoft.com/office/drawing/2014/main" id="{54F416E1-F5B3-4C40-B35B-1A9B3C9497BE}"/>
+                <a16:creationId xmlns:a16="http://schemas.microsoft.com/office/drawing/2014/main" id="{06CA595A-A85A-A544-A158-6035B24ED9E1}"/>
               </a:ext>
             </a:extLst>
           </p:cNvPr>
@@ -5484,14 +5543,42 @@
         </p:blipFill>
         <p:spPr>
           <a:xfrm>
-            <a:off x="976630" y="1527810"/>
-            <a:ext cx="9080500" cy="3314700"/>
+            <a:off x="1227632" y="1588484"/>
+            <a:ext cx="8684084" cy="3557040"/>
           </a:xfrm>
           <a:prstGeom prst="rect">
             <a:avLst/>
           </a:prstGeom>
         </p:spPr>
       </p:pic>
+      <p:sp>
+        <p:nvSpPr>
+          <p:cNvPr id="2" name="Title 1">
+            <a:extLst>
+              <a:ext uri="{FF2B5EF4-FFF2-40B4-BE49-F238E27FC236}">
+                <a16:creationId xmlns:a16="http://schemas.microsoft.com/office/drawing/2014/main" id="{3D9B8D10-3646-064E-B219-91168F927F19}"/>
+              </a:ext>
+            </a:extLst>
+          </p:cNvPr>
+          <p:cNvSpPr>
+            <a:spLocks noGrp="1"/>
+          </p:cNvSpPr>
+          <p:nvPr>
+            <p:ph type="title"/>
+          </p:nvPr>
+        </p:nvSpPr>
+        <p:spPr/>
+        <p:txBody>
+          <a:bodyPr/>
+          <a:lstStyle/>
+          <a:p>
+            <a:r>
+              <a:rPr lang="en-US" dirty="0"/>
+              <a:t>Run 132 Monte Carlo Simulations</a:t>
+            </a:r>
+          </a:p>
+        </p:txBody>
+      </p:sp>
       <p:sp>
         <p:nvSpPr>
           <p:cNvPr id="5" name="TextBox 4">
@@ -5547,7 +5634,7 @@
         </p:nvSpPr>
         <p:spPr>
           <a:xfrm>
-            <a:off x="10452879" y="4473178"/>
+            <a:off x="10391919" y="4427458"/>
             <a:ext cx="1237647" cy="369332"/>
           </a:xfrm>
           <a:prstGeom prst="rect">
@@ -5632,7 +5719,7 @@
         </p:nvCxnSpPr>
         <p:spPr>
           <a:xfrm flipH="1">
-            <a:off x="9714865" y="4657844"/>
+            <a:off x="9653905" y="4612124"/>
             <a:ext cx="738014" cy="0"/>
           </a:xfrm>
           <a:prstGeom prst="straightConnector1">
@@ -5781,15 +5868,7 @@
           <a:p>
             <a:r>
               <a:rPr lang="en-US" dirty="0"/>
-              <a:t>Results for </a:t>
-            </a:r>
-            <a:r>
-              <a:rPr lang="en-US" dirty="0" err="1"/>
-              <a:t>sample_size</a:t>
-            </a:r>
-            <a:r>
-              <a:rPr lang="en-US" dirty="0"/>
-              <a:t> = 5</a:t>
+              <a:t>Results for sample size of 5</a:t>
             </a:r>
           </a:p>
         </p:txBody>
@@ -5854,12 +5933,40 @@
           <a:chExt cx="0" cy="0"/>
         </a:xfrm>
       </p:grpSpPr>
+      <p:sp>
+        <p:nvSpPr>
+          <p:cNvPr id="2" name="Title 1">
+            <a:extLst>
+              <a:ext uri="{FF2B5EF4-FFF2-40B4-BE49-F238E27FC236}">
+                <a16:creationId xmlns:a16="http://schemas.microsoft.com/office/drawing/2014/main" id="{3112AB31-F137-5A47-B009-E57C46842D31}"/>
+              </a:ext>
+            </a:extLst>
+          </p:cNvPr>
+          <p:cNvSpPr>
+            <a:spLocks noGrp="1"/>
+          </p:cNvSpPr>
+          <p:nvPr>
+            <p:ph type="title"/>
+          </p:nvPr>
+        </p:nvSpPr>
+        <p:spPr/>
+        <p:txBody>
+          <a:bodyPr/>
+          <a:lstStyle/>
+          <a:p>
+            <a:r>
+              <a:rPr lang="en-US" dirty="0"/>
+              <a:t>Visualizing Coverage</a:t>
+            </a:r>
+          </a:p>
+        </p:txBody>
+      </p:sp>
       <p:pic>
         <p:nvPicPr>
-          <p:cNvPr id="4" name="Picture 3">
-            <a:extLst>
-              <a:ext uri="{FF2B5EF4-FFF2-40B4-BE49-F238E27FC236}">
-                <a16:creationId xmlns:a16="http://schemas.microsoft.com/office/drawing/2014/main" id="{F34F4627-C03F-4943-A562-F614E59FF60F}"/>
+          <p:cNvPr id="3" name="Picture 2">
+            <a:extLst>
+              <a:ext uri="{FF2B5EF4-FFF2-40B4-BE49-F238E27FC236}">
+                <a16:creationId xmlns:a16="http://schemas.microsoft.com/office/drawing/2014/main" id="{F40B6808-9563-DF4C-BD8D-C4F654EBA509}"/>
               </a:ext>
             </a:extLst>
           </p:cNvPr>
@@ -5876,8 +5983,8 @@
         </p:blipFill>
         <p:spPr>
           <a:xfrm>
-            <a:off x="502920" y="138413"/>
-            <a:ext cx="8877329" cy="6581174"/>
+            <a:off x="838200" y="1960917"/>
+            <a:ext cx="9527540" cy="2151380"/>
           </a:xfrm>
           <a:prstGeom prst="rect">
             <a:avLst/>
@@ -5887,7 +5994,7 @@
     </p:spTree>
     <p:extLst>
       <p:ext uri="{BB962C8B-B14F-4D97-AF65-F5344CB8AC3E}">
-        <p14:creationId xmlns:p14="http://schemas.microsoft.com/office/powerpoint/2010/main" val="2158295507"/>
+        <p14:creationId xmlns:p14="http://schemas.microsoft.com/office/powerpoint/2010/main" val="2890505752"/>
       </p:ext>
     </p:extLst>
   </p:cSld>
@@ -5916,10 +6023,10 @@
       </p:grpSpPr>
       <p:pic>
         <p:nvPicPr>
-          <p:cNvPr id="4" name="Picture 3">
-            <a:extLst>
-              <a:ext uri="{FF2B5EF4-FFF2-40B4-BE49-F238E27FC236}">
-                <a16:creationId xmlns:a16="http://schemas.microsoft.com/office/drawing/2014/main" id="{6FD20175-6319-0D45-9881-872E163E91D1}"/>
+          <p:cNvPr id="2" name="Picture 1">
+            <a:extLst>
+              <a:ext uri="{FF2B5EF4-FFF2-40B4-BE49-F238E27FC236}">
+                <a16:creationId xmlns:a16="http://schemas.microsoft.com/office/drawing/2014/main" id="{C28281CD-6A66-7F4D-89FE-864A93DB00A1}"/>
               </a:ext>
             </a:extLst>
           </p:cNvPr>
@@ -5929,123 +6036,25 @@
           <p:nvPr/>
         </p:nvPicPr>
         <p:blipFill>
-          <a:blip r:embed="rId3"/>
+          <a:blip r:embed="rId2"/>
           <a:stretch>
             <a:fillRect/>
           </a:stretch>
         </p:blipFill>
         <p:spPr>
           <a:xfrm>
-            <a:off x="350520" y="185806"/>
-            <a:ext cx="8915400" cy="6624339"/>
+            <a:off x="764540" y="511837"/>
+            <a:ext cx="8257540" cy="6057934"/>
           </a:xfrm>
           <a:prstGeom prst="rect">
             <a:avLst/>
           </a:prstGeom>
         </p:spPr>
       </p:pic>
-      <p:cxnSp>
-        <p:nvCxnSpPr>
-          <p:cNvPr id="6" name="Straight Arrow Connector 5">
-            <a:extLst>
-              <a:ext uri="{FF2B5EF4-FFF2-40B4-BE49-F238E27FC236}">
-                <a16:creationId xmlns:a16="http://schemas.microsoft.com/office/drawing/2014/main" id="{12EBEE50-A42B-8747-AB58-CF3766D8D1AC}"/>
-              </a:ext>
-            </a:extLst>
-          </p:cNvPr>
-          <p:cNvCxnSpPr/>
-          <p:nvPr/>
-        </p:nvCxnSpPr>
-        <p:spPr>
-          <a:xfrm flipH="1" flipV="1">
-            <a:off x="2346960" y="899160"/>
-            <a:ext cx="350520" cy="579120"/>
-          </a:xfrm>
-          <a:prstGeom prst="straightConnector1">
-            <a:avLst/>
-          </a:prstGeom>
-          <a:ln>
-            <a:solidFill>
-              <a:srgbClr val="C00000"/>
-            </a:solidFill>
-            <a:tailEnd type="triangle"/>
-          </a:ln>
-        </p:spPr>
-        <p:style>
-          <a:lnRef idx="1">
-            <a:schemeClr val="accent1"/>
-          </a:lnRef>
-          <a:fillRef idx="0">
-            <a:schemeClr val="accent1"/>
-          </a:fillRef>
-          <a:effectRef idx="0">
-            <a:schemeClr val="accent1"/>
-          </a:effectRef>
-          <a:fontRef idx="minor">
-            <a:schemeClr val="tx1"/>
-          </a:fontRef>
-        </p:style>
-      </p:cxnSp>
-      <p:sp>
-        <p:nvSpPr>
-          <p:cNvPr id="7" name="TextBox 6">
-            <a:extLst>
-              <a:ext uri="{FF2B5EF4-FFF2-40B4-BE49-F238E27FC236}">
-                <a16:creationId xmlns:a16="http://schemas.microsoft.com/office/drawing/2014/main" id="{D5D9D77F-0EED-0749-A519-60B940C9BE55}"/>
-              </a:ext>
-            </a:extLst>
-          </p:cNvPr>
-          <p:cNvSpPr txBox="1"/>
-          <p:nvPr/>
-        </p:nvSpPr>
-        <p:spPr>
-          <a:xfrm>
-            <a:off x="2204162" y="1478280"/>
-            <a:ext cx="2280368" cy="954107"/>
-          </a:xfrm>
-          <a:prstGeom prst="rect">
-            <a:avLst/>
-          </a:prstGeom>
-          <a:noFill/>
-        </p:spPr>
-        <p:txBody>
-          <a:bodyPr wrap="none" rtlCol="0">
-            <a:spAutoFit/>
-          </a:bodyPr>
-          <a:lstStyle/>
-          <a:p>
-            <a:r>
-              <a:rPr lang="en-US" sz="1400" dirty="0"/>
-              <a:t>At small sample sizes,</a:t>
-            </a:r>
-            <a:br>
-              <a:rPr lang="en-US" sz="1400" dirty="0"/>
-            </a:br>
-            <a:r>
-              <a:rPr lang="en-US" sz="1400" dirty="0"/>
-              <a:t>observed p has less</a:t>
-            </a:r>
-            <a:br>
-              <a:rPr lang="en-US" sz="1400" dirty="0"/>
-            </a:br>
-            <a:r>
-              <a:rPr lang="en-US" sz="1400" dirty="0"/>
-              <a:t>variability, leading to </a:t>
-            </a:r>
-            <a:br>
-              <a:rPr lang="en-US" sz="1400" dirty="0"/>
-            </a:br>
-            <a:r>
-              <a:rPr lang="en-US" sz="1400" dirty="0"/>
-              <a:t>higher coverage percentages</a:t>
-            </a:r>
-          </a:p>
-        </p:txBody>
-      </p:sp>
     </p:spTree>
     <p:extLst>
       <p:ext uri="{BB962C8B-B14F-4D97-AF65-F5344CB8AC3E}">
-        <p14:creationId xmlns:p14="http://schemas.microsoft.com/office/powerpoint/2010/main" val="938453523"/>
+        <p14:creationId xmlns:p14="http://schemas.microsoft.com/office/powerpoint/2010/main" val="2158295507"/>
       </p:ext>
     </p:extLst>
   </p:cSld>
@@ -6072,12 +6081,84 @@
           <a:chExt cx="0" cy="0"/>
         </a:xfrm>
       </p:grpSpPr>
-      <p:sp>
-        <p:nvSpPr>
-          <p:cNvPr id="3" name="TextBox 2">
-            <a:extLst>
-              <a:ext uri="{FF2B5EF4-FFF2-40B4-BE49-F238E27FC236}">
-                <a16:creationId xmlns:a16="http://schemas.microsoft.com/office/drawing/2014/main" id="{D639DFBB-76B2-E64D-91BA-C82ACDE98D30}"/>
+      <p:pic>
+        <p:nvPicPr>
+          <p:cNvPr id="8" name="Picture 7">
+            <a:extLst>
+              <a:ext uri="{FF2B5EF4-FFF2-40B4-BE49-F238E27FC236}">
+                <a16:creationId xmlns:a16="http://schemas.microsoft.com/office/drawing/2014/main" id="{39D17D3E-2C31-4B44-AC15-A78B1B1382C0}"/>
+              </a:ext>
+            </a:extLst>
+          </p:cNvPr>
+          <p:cNvPicPr>
+            <a:picLocks noChangeAspect="1"/>
+          </p:cNvPicPr>
+          <p:nvPr/>
+        </p:nvPicPr>
+        <p:blipFill>
+          <a:blip r:embed="rId3"/>
+          <a:stretch>
+            <a:fillRect/>
+          </a:stretch>
+        </p:blipFill>
+        <p:spPr>
+          <a:xfrm>
+            <a:off x="675640" y="428915"/>
+            <a:ext cx="8575040" cy="6290859"/>
+          </a:xfrm>
+          <a:prstGeom prst="rect">
+            <a:avLst/>
+          </a:prstGeom>
+        </p:spPr>
+      </p:pic>
+      <p:cxnSp>
+        <p:nvCxnSpPr>
+          <p:cNvPr id="6" name="Straight Arrow Connector 5">
+            <a:extLst>
+              <a:ext uri="{FF2B5EF4-FFF2-40B4-BE49-F238E27FC236}">
+                <a16:creationId xmlns:a16="http://schemas.microsoft.com/office/drawing/2014/main" id="{12EBEE50-A42B-8747-AB58-CF3766D8D1AC}"/>
+              </a:ext>
+            </a:extLst>
+          </p:cNvPr>
+          <p:cNvCxnSpPr/>
+          <p:nvPr/>
+        </p:nvCxnSpPr>
+        <p:spPr>
+          <a:xfrm flipH="1" flipV="1">
+            <a:off x="2590800" y="1173480"/>
+            <a:ext cx="350520" cy="579120"/>
+          </a:xfrm>
+          <a:prstGeom prst="straightConnector1">
+            <a:avLst/>
+          </a:prstGeom>
+          <a:ln>
+            <a:solidFill>
+              <a:srgbClr val="C00000"/>
+            </a:solidFill>
+            <a:tailEnd type="triangle"/>
+          </a:ln>
+        </p:spPr>
+        <p:style>
+          <a:lnRef idx="1">
+            <a:schemeClr val="accent1"/>
+          </a:lnRef>
+          <a:fillRef idx="0">
+            <a:schemeClr val="accent1"/>
+          </a:fillRef>
+          <a:effectRef idx="0">
+            <a:schemeClr val="accent1"/>
+          </a:effectRef>
+          <a:fontRef idx="minor">
+            <a:schemeClr val="tx1"/>
+          </a:fontRef>
+        </p:style>
+      </p:cxnSp>
+      <p:sp>
+        <p:nvSpPr>
+          <p:cNvPr id="7" name="TextBox 6">
+            <a:extLst>
+              <a:ext uri="{FF2B5EF4-FFF2-40B4-BE49-F238E27FC236}">
+                <a16:creationId xmlns:a16="http://schemas.microsoft.com/office/drawing/2014/main" id="{D5D9D77F-0EED-0749-A519-60B940C9BE55}"/>
               </a:ext>
             </a:extLst>
           </p:cNvPr>
@@ -6086,8 +6167,8 @@
         </p:nvSpPr>
         <p:spPr>
           <a:xfrm>
-            <a:off x="4526165" y="2967200"/>
-            <a:ext cx="3401893" cy="1569660"/>
+            <a:off x="2941320" y="1600200"/>
+            <a:ext cx="2280368" cy="954107"/>
           </a:xfrm>
           <a:prstGeom prst="rect">
             <a:avLst/>
@@ -6101,8 +6182,120 @@
           <a:lstStyle/>
           <a:p>
             <a:r>
-              <a:rPr lang="en-US" sz="9600" dirty="0"/>
-              <a:t>Q &amp; A </a:t>
+              <a:rPr lang="en-US" sz="1400" dirty="0"/>
+              <a:t>At small sample sizes,</a:t>
+            </a:r>
+            <a:br>
+              <a:rPr lang="en-US" sz="1400" dirty="0"/>
+            </a:br>
+            <a:r>
+              <a:rPr lang="en-US" sz="1400" dirty="0"/>
+              <a:t>observed p has less</a:t>
+            </a:r>
+            <a:br>
+              <a:rPr lang="en-US" sz="1400" dirty="0"/>
+            </a:br>
+            <a:r>
+              <a:rPr lang="en-US" sz="1400" dirty="0"/>
+              <a:t>variability, leading to </a:t>
+            </a:r>
+            <a:br>
+              <a:rPr lang="en-US" sz="1400" dirty="0"/>
+            </a:br>
+            <a:r>
+              <a:rPr lang="en-US" sz="1400" dirty="0"/>
+              <a:t>higher coverage percentages</a:t>
+            </a:r>
+          </a:p>
+        </p:txBody>
+      </p:sp>
+      <p:cxnSp>
+        <p:nvCxnSpPr>
+          <p:cNvPr id="9" name="Straight Arrow Connector 8">
+            <a:extLst>
+              <a:ext uri="{FF2B5EF4-FFF2-40B4-BE49-F238E27FC236}">
+                <a16:creationId xmlns:a16="http://schemas.microsoft.com/office/drawing/2014/main" id="{7C13ADD8-BA2C-D24F-AE92-CE0347906E88}"/>
+              </a:ext>
+            </a:extLst>
+          </p:cNvPr>
+          <p:cNvCxnSpPr/>
+          <p:nvPr/>
+        </p:nvCxnSpPr>
+        <p:spPr>
+          <a:xfrm flipH="1" flipV="1">
+            <a:off x="6650274" y="1158240"/>
+            <a:ext cx="350520" cy="579120"/>
+          </a:xfrm>
+          <a:prstGeom prst="straightConnector1">
+            <a:avLst/>
+          </a:prstGeom>
+          <a:ln>
+            <a:solidFill>
+              <a:srgbClr val="C00000"/>
+            </a:solidFill>
+            <a:tailEnd type="triangle"/>
+          </a:ln>
+        </p:spPr>
+        <p:style>
+          <a:lnRef idx="1">
+            <a:schemeClr val="accent1"/>
+          </a:lnRef>
+          <a:fillRef idx="0">
+            <a:schemeClr val="accent1"/>
+          </a:fillRef>
+          <a:effectRef idx="0">
+            <a:schemeClr val="accent1"/>
+          </a:effectRef>
+          <a:fontRef idx="minor">
+            <a:schemeClr val="tx1"/>
+          </a:fontRef>
+        </p:style>
+      </p:cxnSp>
+      <p:sp>
+        <p:nvSpPr>
+          <p:cNvPr id="10" name="TextBox 9">
+            <a:extLst>
+              <a:ext uri="{FF2B5EF4-FFF2-40B4-BE49-F238E27FC236}">
+                <a16:creationId xmlns:a16="http://schemas.microsoft.com/office/drawing/2014/main" id="{B4B2FDF9-2F95-B34C-B877-3715B190A505}"/>
+              </a:ext>
+            </a:extLst>
+          </p:cNvPr>
+          <p:cNvSpPr txBox="1"/>
+          <p:nvPr/>
+        </p:nvSpPr>
+        <p:spPr>
+          <a:xfrm>
+            <a:off x="7000794" y="1600200"/>
+            <a:ext cx="1986249" cy="738664"/>
+          </a:xfrm>
+          <a:prstGeom prst="rect">
+            <a:avLst/>
+          </a:prstGeom>
+          <a:noFill/>
+        </p:spPr>
+        <p:txBody>
+          <a:bodyPr wrap="none" rtlCol="0">
+            <a:spAutoFit/>
+          </a:bodyPr>
+          <a:lstStyle/>
+          <a:p>
+            <a:r>
+              <a:rPr lang="en-US" sz="1400" dirty="0"/>
+              <a:t>Adjusted coverages are</a:t>
+            </a:r>
+            <a:br>
+              <a:rPr lang="en-US" sz="1400" dirty="0"/>
+            </a:br>
+            <a:r>
+              <a:rPr lang="en-US" sz="1400" dirty="0"/>
+              <a:t>more conservative, with </a:t>
+            </a:r>
+            <a:br>
+              <a:rPr lang="en-US" sz="1400" dirty="0"/>
+            </a:br>
+            <a:r>
+              <a:rPr lang="en-US" sz="1400" dirty="0"/>
+              <a:t>values exceeding 95% </a:t>
             </a:r>
           </a:p>
         </p:txBody>
@@ -6110,7 +6303,7 @@
     </p:spTree>
     <p:extLst>
       <p:ext uri="{BB962C8B-B14F-4D97-AF65-F5344CB8AC3E}">
-        <p14:creationId xmlns:p14="http://schemas.microsoft.com/office/powerpoint/2010/main" val="3085140371"/>
+        <p14:creationId xmlns:p14="http://schemas.microsoft.com/office/powerpoint/2010/main" val="938453523"/>
       </p:ext>
     </p:extLst>
   </p:cSld>
@@ -6139,38 +6332,10 @@
       </p:grpSpPr>
       <p:sp>
         <p:nvSpPr>
-          <p:cNvPr id="2" name="Title 1">
-            <a:extLst>
-              <a:ext uri="{FF2B5EF4-FFF2-40B4-BE49-F238E27FC236}">
-                <a16:creationId xmlns:a16="http://schemas.microsoft.com/office/drawing/2014/main" id="{B6E12943-F375-9A4E-9A27-CADD138F80A5}"/>
-              </a:ext>
-            </a:extLst>
-          </p:cNvPr>
-          <p:cNvSpPr>
-            <a:spLocks noGrp="1"/>
-          </p:cNvSpPr>
-          <p:nvPr>
-            <p:ph type="title"/>
-          </p:nvPr>
-        </p:nvSpPr>
-        <p:spPr/>
-        <p:txBody>
-          <a:bodyPr/>
-          <a:lstStyle/>
-          <a:p>
-            <a:r>
-              <a:rPr lang="en-US" dirty="0"/>
-              <a:t>References</a:t>
-            </a:r>
-          </a:p>
-        </p:txBody>
-      </p:sp>
-      <p:sp>
-        <p:nvSpPr>
           <p:cNvPr id="3" name="TextBox 2">
             <a:extLst>
               <a:ext uri="{FF2B5EF4-FFF2-40B4-BE49-F238E27FC236}">
-                <a16:creationId xmlns:a16="http://schemas.microsoft.com/office/drawing/2014/main" id="{4C39AB42-EC56-B94E-A94E-9644D979DF28}"/>
+                <a16:creationId xmlns:a16="http://schemas.microsoft.com/office/drawing/2014/main" id="{D639DFBB-76B2-E64D-91BA-C82ACDE98D30}"/>
               </a:ext>
             </a:extLst>
           </p:cNvPr>
@@ -6179,8 +6344,8 @@
         </p:nvSpPr>
         <p:spPr>
           <a:xfrm>
-            <a:off x="1127760" y="1828800"/>
-            <a:ext cx="9769406" cy="2246769"/>
+            <a:off x="4526165" y="2967200"/>
+            <a:ext cx="3401893" cy="1569660"/>
           </a:xfrm>
           <a:prstGeom prst="rect">
             <a:avLst/>
@@ -6194,86 +6359,8 @@
           <a:lstStyle/>
           <a:p>
             <a:r>
-              <a:rPr lang="en-US" sz="2000" dirty="0"/>
-              <a:t>Monte Carlo Simulation of Bernoulli Trials (blog article version of this presentation): </a:t>
-            </a:r>
-            <a:br>
-              <a:rPr lang="en-US" sz="2000" dirty="0"/>
-            </a:br>
-            <a:r>
-              <a:rPr lang="en-US" sz="2000" dirty="0">
-                <a:hlinkClick r:id="rId2"/>
-              </a:rPr>
-              <a:t>http://bit.ly/2PicLJN</a:t>
-            </a:r>
-            <a:r>
-              <a:rPr lang="en-US" sz="2000" dirty="0"/>
-              <a:t> </a:t>
-            </a:r>
-          </a:p>
-          <a:p>
-            <a:endParaRPr lang="en-US" sz="2000" dirty="0"/>
-          </a:p>
-          <a:p>
-            <a:r>
-              <a:rPr lang="en-US" sz="2000" dirty="0"/>
-              <a:t>Coverage probability for confidence interval (</a:t>
-            </a:r>
-            <a:r>
-              <a:rPr lang="en-US" sz="2000" dirty="0" err="1"/>
-              <a:t>Stackoverflow</a:t>
-            </a:r>
-            <a:r>
-              <a:rPr lang="en-US" sz="2000" dirty="0"/>
-              <a:t> question): </a:t>
-            </a:r>
-            <a:r>
-              <a:rPr lang="en-US" sz="2000" dirty="0">
-                <a:hlinkClick r:id="rId3"/>
-              </a:rPr>
-              <a:t>https://bit.ly/33l04lC</a:t>
-            </a:r>
-            <a:r>
-              <a:rPr lang="en-US" sz="2000" dirty="0"/>
-              <a:t> </a:t>
-            </a:r>
-          </a:p>
-          <a:p>
-            <a:endParaRPr lang="en-US" sz="2000" dirty="0"/>
-          </a:p>
-          <a:p>
-            <a:r>
-              <a:rPr lang="en-US" sz="2000" i="1" dirty="0"/>
-              <a:t>Estimating Completion Rates from Small Sample Sizes Using Binomial</a:t>
-            </a:r>
-            <a:br>
-              <a:rPr lang="en-US" sz="2000" i="1" dirty="0"/>
-            </a:br>
-            <a:r>
-              <a:rPr lang="en-US" sz="2000" i="1" dirty="0"/>
-              <a:t>Confidence Intervals</a:t>
-            </a:r>
-            <a:r>
-              <a:rPr lang="en-US" sz="2000" dirty="0"/>
-              <a:t>, </a:t>
-            </a:r>
-            <a:r>
-              <a:rPr lang="en-US" sz="2000" dirty="0" err="1"/>
-              <a:t>Sauro</a:t>
-            </a:r>
-            <a:r>
-              <a:rPr lang="en-US" sz="2000" dirty="0"/>
-              <a:t> &amp; Lewis 2005: </a:t>
-            </a:r>
-            <a:r>
-              <a:rPr lang="en-US" sz="2000" dirty="0">
-                <a:hlinkClick r:id="rId4"/>
-              </a:rPr>
-              <a:t>http://bit.ly/estimatingCoverageRates</a:t>
-            </a:r>
-            <a:r>
-              <a:rPr lang="en-US" sz="2000" dirty="0"/>
-              <a:t> </a:t>
+              <a:rPr lang="en-US" sz="9600" dirty="0"/>
+              <a:t>Q &amp; A </a:t>
             </a:r>
           </a:p>
         </p:txBody>
@@ -6281,7 +6368,7 @@
     </p:spTree>
     <p:extLst>
       <p:ext uri="{BB962C8B-B14F-4D97-AF65-F5344CB8AC3E}">
-        <p14:creationId xmlns:p14="http://schemas.microsoft.com/office/powerpoint/2010/main" val="2291217490"/>
+        <p14:creationId xmlns:p14="http://schemas.microsoft.com/office/powerpoint/2010/main" val="3085140371"/>
       </p:ext>
     </p:extLst>
   </p:cSld>
@@ -6788,6 +6875,177 @@
 </file>
 
 <file path=ppt/slides/slide20.xml><?xml version="1.0" encoding="utf-8"?>
+<p:sld xmlns:a="http://schemas.openxmlformats.org/drawingml/2006/main" xmlns:r="http://schemas.openxmlformats.org/officeDocument/2006/relationships" xmlns:p="http://schemas.openxmlformats.org/presentationml/2006/main">
+  <p:cSld>
+    <p:spTree>
+      <p:nvGrpSpPr>
+        <p:cNvPr id="1" name=""/>
+        <p:cNvGrpSpPr/>
+        <p:nvPr/>
+      </p:nvGrpSpPr>
+      <p:grpSpPr>
+        <a:xfrm>
+          <a:off x="0" y="0"/>
+          <a:ext cx="0" cy="0"/>
+          <a:chOff x="0" y="0"/>
+          <a:chExt cx="0" cy="0"/>
+        </a:xfrm>
+      </p:grpSpPr>
+      <p:sp>
+        <p:nvSpPr>
+          <p:cNvPr id="2" name="Title 1">
+            <a:extLst>
+              <a:ext uri="{FF2B5EF4-FFF2-40B4-BE49-F238E27FC236}">
+                <a16:creationId xmlns:a16="http://schemas.microsoft.com/office/drawing/2014/main" id="{B6E12943-F375-9A4E-9A27-CADD138F80A5}"/>
+              </a:ext>
+            </a:extLst>
+          </p:cNvPr>
+          <p:cNvSpPr>
+            <a:spLocks noGrp="1"/>
+          </p:cNvSpPr>
+          <p:nvPr>
+            <p:ph type="title"/>
+          </p:nvPr>
+        </p:nvSpPr>
+        <p:spPr/>
+        <p:txBody>
+          <a:bodyPr/>
+          <a:lstStyle/>
+          <a:p>
+            <a:r>
+              <a:rPr lang="en-US" dirty="0"/>
+              <a:t>References</a:t>
+            </a:r>
+          </a:p>
+        </p:txBody>
+      </p:sp>
+      <p:sp>
+        <p:nvSpPr>
+          <p:cNvPr id="3" name="TextBox 2">
+            <a:extLst>
+              <a:ext uri="{FF2B5EF4-FFF2-40B4-BE49-F238E27FC236}">
+                <a16:creationId xmlns:a16="http://schemas.microsoft.com/office/drawing/2014/main" id="{4C39AB42-EC56-B94E-A94E-9644D979DF28}"/>
+              </a:ext>
+            </a:extLst>
+          </p:cNvPr>
+          <p:cNvSpPr txBox="1"/>
+          <p:nvPr/>
+        </p:nvSpPr>
+        <p:spPr>
+          <a:xfrm>
+            <a:off x="1127760" y="1828800"/>
+            <a:ext cx="9769406" cy="2246769"/>
+          </a:xfrm>
+          <a:prstGeom prst="rect">
+            <a:avLst/>
+          </a:prstGeom>
+          <a:noFill/>
+        </p:spPr>
+        <p:txBody>
+          <a:bodyPr wrap="none" rtlCol="0">
+            <a:spAutoFit/>
+          </a:bodyPr>
+          <a:lstStyle/>
+          <a:p>
+            <a:r>
+              <a:rPr lang="en-US" sz="2000" dirty="0"/>
+              <a:t>Monte Carlo Simulation of Bernoulli Trials (blog article version of this presentation): </a:t>
+            </a:r>
+            <a:br>
+              <a:rPr lang="en-US" sz="2000" dirty="0"/>
+            </a:br>
+            <a:r>
+              <a:rPr lang="en-US" sz="2000" dirty="0">
+                <a:hlinkClick r:id="rId2"/>
+              </a:rPr>
+              <a:t>http://bit.ly/2PicLJN</a:t>
+            </a:r>
+            <a:r>
+              <a:rPr lang="en-US" sz="2000" dirty="0"/>
+              <a:t> </a:t>
+            </a:r>
+          </a:p>
+          <a:p>
+            <a:endParaRPr lang="en-US" sz="2000" dirty="0"/>
+          </a:p>
+          <a:p>
+            <a:r>
+              <a:rPr lang="en-US" sz="2000" dirty="0"/>
+              <a:t>Coverage probability for confidence interval (</a:t>
+            </a:r>
+            <a:r>
+              <a:rPr lang="en-US" sz="2000" dirty="0" err="1"/>
+              <a:t>Stackoverflow</a:t>
+            </a:r>
+            <a:r>
+              <a:rPr lang="en-US" sz="2000" dirty="0"/>
+              <a:t> question): </a:t>
+            </a:r>
+            <a:r>
+              <a:rPr lang="en-US" sz="2000" dirty="0">
+                <a:hlinkClick r:id="rId3"/>
+              </a:rPr>
+              <a:t>https://bit.ly/33l04lC</a:t>
+            </a:r>
+            <a:r>
+              <a:rPr lang="en-US" sz="2000" dirty="0"/>
+              <a:t> </a:t>
+            </a:r>
+          </a:p>
+          <a:p>
+            <a:endParaRPr lang="en-US" sz="2000" dirty="0"/>
+          </a:p>
+          <a:p>
+            <a:r>
+              <a:rPr lang="en-US" sz="2000" i="1" dirty="0"/>
+              <a:t>Estimating Completion Rates from Small Sample Sizes Using Binomial</a:t>
+            </a:r>
+            <a:br>
+              <a:rPr lang="en-US" sz="2000" i="1" dirty="0"/>
+            </a:br>
+            <a:r>
+              <a:rPr lang="en-US" sz="2000" i="1" dirty="0"/>
+              <a:t>Confidence Intervals</a:t>
+            </a:r>
+            <a:r>
+              <a:rPr lang="en-US" sz="2000" dirty="0"/>
+              <a:t>, </a:t>
+            </a:r>
+            <a:r>
+              <a:rPr lang="en-US" sz="2000" dirty="0" err="1"/>
+              <a:t>Sauro</a:t>
+            </a:r>
+            <a:r>
+              <a:rPr lang="en-US" sz="2000" dirty="0"/>
+              <a:t> &amp; Lewis 2005: </a:t>
+            </a:r>
+            <a:r>
+              <a:rPr lang="en-US" sz="2000" dirty="0">
+                <a:hlinkClick r:id="rId4"/>
+              </a:rPr>
+              <a:t>http://bit.ly/estimatingCoverageRates</a:t>
+            </a:r>
+            <a:r>
+              <a:rPr lang="en-US" sz="2000" dirty="0"/>
+              <a:t> </a:t>
+            </a:r>
+          </a:p>
+        </p:txBody>
+      </p:sp>
+    </p:spTree>
+    <p:extLst>
+      <p:ext uri="{BB962C8B-B14F-4D97-AF65-F5344CB8AC3E}">
+        <p14:creationId xmlns:p14="http://schemas.microsoft.com/office/powerpoint/2010/main" val="2291217490"/>
+      </p:ext>
+    </p:extLst>
+  </p:cSld>
+  <p:clrMapOvr>
+    <a:masterClrMapping/>
+  </p:clrMapOvr>
+</p:sld>
+</file>
+
+<file path=ppt/slides/slide21.xml><?xml version="1.0" encoding="utf-8"?>
 <p:sld xmlns:a="http://schemas.openxmlformats.org/drawingml/2006/main" xmlns:r="http://schemas.openxmlformats.org/officeDocument/2006/relationships" xmlns:p="http://schemas.openxmlformats.org/presentationml/2006/main">
   <p:cSld>
     <p:spTree>
@@ -7766,8 +8024,8 @@
         </p:nvSpPr>
         <p:spPr>
           <a:xfrm>
-            <a:off x="7231774" y="2720072"/>
-            <a:ext cx="4122026" cy="1938992"/>
+            <a:off x="7208925" y="2132106"/>
+            <a:ext cx="4661469" cy="3170099"/>
           </a:xfrm>
           <a:prstGeom prst="rect">
             <a:avLst/>
@@ -7786,7 +8044,14 @@
             </a:pPr>
             <a:r>
               <a:rPr lang="en-US" sz="2000" dirty="0"/>
-              <a:t>A distribution that looks binomial</a:t>
+              <a:t>Simulations generate distributions</a:t>
+            </a:r>
+            <a:br>
+              <a:rPr lang="en-US" sz="2000" dirty="0"/>
+            </a:br>
+            <a:r>
+              <a:rPr lang="en-US" sz="2000" dirty="0"/>
+              <a:t>that look binomial</a:t>
             </a:r>
             <a:br>
               <a:rPr lang="en-US" sz="2000" dirty="0"/>
@@ -7800,7 +8065,28 @@
             </a:pPr>
             <a:r>
               <a:rPr lang="en-US" sz="2000" dirty="0"/>
-              <a:t>A coverage percentage close to</a:t>
+              <a:t>Each simulation of 10,000 trials results</a:t>
+            </a:r>
+            <a:br>
+              <a:rPr lang="en-US" sz="2000" dirty="0"/>
+            </a:br>
+            <a:r>
+              <a:rPr lang="en-US" sz="2000" dirty="0"/>
+              <a:t>in one coverage number</a:t>
+            </a:r>
+            <a:br>
+              <a:rPr lang="en-US" sz="2000" dirty="0"/>
+            </a:br>
+            <a:endParaRPr lang="en-US" sz="2000" dirty="0"/>
+          </a:p>
+          <a:p>
+            <a:pPr marL="457200" indent="-457200">
+              <a:buFont typeface="Arial" panose="020B0604020202020204" pitchFamily="34" charset="0"/>
+              <a:buChar char="•"/>
+            </a:pPr>
+            <a:r>
+              <a:rPr lang="en-US" sz="2000" dirty="0"/>
+              <a:t>Coverage percentage close to</a:t>
             </a:r>
             <a:br>
               <a:rPr lang="en-US" sz="2000" dirty="0"/>
@@ -7944,12 +8230,92 @@
           </a:p>
         </p:txBody>
       </p:sp>
+      <p:sp>
+        <p:nvSpPr>
+          <p:cNvPr id="7" name="TextBox 6">
+            <a:extLst>
+              <a:ext uri="{FF2B5EF4-FFF2-40B4-BE49-F238E27FC236}">
+                <a16:creationId xmlns:a16="http://schemas.microsoft.com/office/drawing/2014/main" id="{0C8761D5-55B2-0045-B2E0-9FAAFD7D2696}"/>
+              </a:ext>
+            </a:extLst>
+          </p:cNvPr>
+          <p:cNvSpPr txBox="1"/>
+          <p:nvPr/>
+        </p:nvSpPr>
+        <p:spPr>
+          <a:xfrm>
+            <a:off x="9106294" y="2151727"/>
+            <a:ext cx="2887586" cy="3477875"/>
+          </a:xfrm>
+          <a:prstGeom prst="rect">
+            <a:avLst/>
+          </a:prstGeom>
+          <a:noFill/>
+        </p:spPr>
+        <p:txBody>
+          <a:bodyPr wrap="square" rtlCol="0">
+            <a:spAutoFit/>
+          </a:bodyPr>
+          <a:lstStyle/>
+          <a:p>
+            <a:r>
+              <a:rPr lang="en-US" sz="2000" dirty="0"/>
+              <a:t>Refactoring to use data frames facilitates understanding</a:t>
+            </a:r>
+            <a:br>
+              <a:rPr lang="en-US" sz="2000" dirty="0"/>
+            </a:br>
+            <a:br>
+              <a:rPr lang="en-US" sz="2000" dirty="0"/>
+            </a:br>
+            <a:r>
+              <a:rPr lang="en-US" sz="2000" dirty="0"/>
+              <a:t>Use of more descriptive</a:t>
+            </a:r>
+            <a:br>
+              <a:rPr lang="en-US" sz="2000" dirty="0"/>
+            </a:br>
+            <a:r>
+              <a:rPr lang="en-US" sz="2000" dirty="0"/>
+              <a:t>variable names also</a:t>
+            </a:r>
+            <a:br>
+              <a:rPr lang="en-US" sz="2000" dirty="0"/>
+            </a:br>
+            <a:r>
+              <a:rPr lang="en-US" sz="2000" dirty="0"/>
+              <a:t>facilitates understanding</a:t>
+            </a:r>
+            <a:br>
+              <a:rPr lang="en-US" sz="2000" dirty="0"/>
+            </a:br>
+            <a:br>
+              <a:rPr lang="en-US" sz="2000" dirty="0"/>
+            </a:br>
+            <a:r>
+              <a:rPr lang="en-US" sz="2000" dirty="0"/>
+              <a:t>We’ll refactor for speed</a:t>
+            </a:r>
+            <a:br>
+              <a:rPr lang="en-US" sz="2000" dirty="0"/>
+            </a:br>
+            <a:r>
+              <a:rPr lang="en-US" sz="2000" dirty="0"/>
+              <a:t>in a subsequent step</a:t>
+            </a:r>
+            <a:br>
+              <a:rPr lang="en-US" sz="2000" dirty="0"/>
+            </a:br>
+            <a:endParaRPr lang="en-US" sz="2000" dirty="0"/>
+          </a:p>
+        </p:txBody>
+      </p:sp>
       <p:pic>
         <p:nvPicPr>
-          <p:cNvPr id="6" name="Picture 5">
-            <a:extLst>
-              <a:ext uri="{FF2B5EF4-FFF2-40B4-BE49-F238E27FC236}">
-                <a16:creationId xmlns:a16="http://schemas.microsoft.com/office/drawing/2014/main" id="{4EDB850D-27C8-3444-946A-97B19A717B1C}"/>
+          <p:cNvPr id="3" name="Picture 2">
+            <a:extLst>
+              <a:ext uri="{FF2B5EF4-FFF2-40B4-BE49-F238E27FC236}">
+                <a16:creationId xmlns:a16="http://schemas.microsoft.com/office/drawing/2014/main" id="{E376CB96-DFB7-8F44-8FF2-5E2687165D67}"/>
               </a:ext>
             </a:extLst>
           </p:cNvPr>
@@ -7966,94 +8332,14 @@
         </p:blipFill>
         <p:spPr>
           <a:xfrm>
-            <a:off x="989330" y="1474470"/>
-            <a:ext cx="7835900" cy="4610100"/>
+            <a:off x="838200" y="1795165"/>
+            <a:ext cx="8130047" cy="3807460"/>
           </a:xfrm>
           <a:prstGeom prst="rect">
             <a:avLst/>
           </a:prstGeom>
         </p:spPr>
       </p:pic>
-      <p:sp>
-        <p:nvSpPr>
-          <p:cNvPr id="7" name="TextBox 6">
-            <a:extLst>
-              <a:ext uri="{FF2B5EF4-FFF2-40B4-BE49-F238E27FC236}">
-                <a16:creationId xmlns:a16="http://schemas.microsoft.com/office/drawing/2014/main" id="{0C8761D5-55B2-0045-B2E0-9FAAFD7D2696}"/>
-              </a:ext>
-            </a:extLst>
-          </p:cNvPr>
-          <p:cNvSpPr txBox="1"/>
-          <p:nvPr/>
-        </p:nvSpPr>
-        <p:spPr>
-          <a:xfrm>
-            <a:off x="9106294" y="2151727"/>
-            <a:ext cx="2887586" cy="3477875"/>
-          </a:xfrm>
-          <a:prstGeom prst="rect">
-            <a:avLst/>
-          </a:prstGeom>
-          <a:noFill/>
-        </p:spPr>
-        <p:txBody>
-          <a:bodyPr wrap="square" rtlCol="0">
-            <a:spAutoFit/>
-          </a:bodyPr>
-          <a:lstStyle/>
-          <a:p>
-            <a:r>
-              <a:rPr lang="en-US" sz="2000" dirty="0"/>
-              <a:t>Refactoring to use data frames facilitates understanding</a:t>
-            </a:r>
-            <a:br>
-              <a:rPr lang="en-US" sz="2000" dirty="0"/>
-            </a:br>
-            <a:br>
-              <a:rPr lang="en-US" sz="2000" dirty="0"/>
-            </a:br>
-            <a:r>
-              <a:rPr lang="en-US" sz="2000" dirty="0"/>
-              <a:t>Use of more descriptive</a:t>
-            </a:r>
-            <a:br>
-              <a:rPr lang="en-US" sz="2000" dirty="0"/>
-            </a:br>
-            <a:r>
-              <a:rPr lang="en-US" sz="2000" dirty="0"/>
-              <a:t>variable names also</a:t>
-            </a:r>
-            <a:br>
-              <a:rPr lang="en-US" sz="2000" dirty="0"/>
-            </a:br>
-            <a:r>
-              <a:rPr lang="en-US" sz="2000" dirty="0"/>
-              <a:t>facilitates understanding</a:t>
-            </a:r>
-            <a:br>
-              <a:rPr lang="en-US" sz="2000" dirty="0"/>
-            </a:br>
-            <a:br>
-              <a:rPr lang="en-US" sz="2000" dirty="0"/>
-            </a:br>
-            <a:r>
-              <a:rPr lang="en-US" sz="2000" dirty="0"/>
-              <a:t>We’ll refactor for speed</a:t>
-            </a:r>
-            <a:br>
-              <a:rPr lang="en-US" sz="2000" dirty="0"/>
-            </a:br>
-            <a:r>
-              <a:rPr lang="en-US" sz="2000" dirty="0"/>
-              <a:t>in a subsequent step</a:t>
-            </a:r>
-            <a:br>
-              <a:rPr lang="en-US" sz="2000" dirty="0"/>
-            </a:br>
-            <a:endParaRPr lang="en-US" sz="2000" dirty="0"/>
-          </a:p>
-        </p:txBody>
-      </p:sp>
     </p:spTree>
     <p:extLst>
       <p:ext uri="{BB962C8B-B14F-4D97-AF65-F5344CB8AC3E}">

</xml_diff>